<commit_message>
added system insights image
</commit_message>
<xml_diff>
--- a/Windows Server 2019.pptx
+++ b/Windows Server 2019.pptx
@@ -5,15 +5,22 @@
     <p:sldMasterId id="2147483648" r:id="rId1"/>
     <p:sldMasterId id="2147483661" r:id="rId2"/>
   </p:sldMasterIdLst>
+  <p:notesMasterIdLst>
+    <p:notesMasterId r:id="rId15"/>
+  </p:notesMasterIdLst>
   <p:sldIdLst>
     <p:sldId id="256" r:id="rId3"/>
     <p:sldId id="257" r:id="rId4"/>
     <p:sldId id="258" r:id="rId5"/>
     <p:sldId id="259" r:id="rId6"/>
     <p:sldId id="260" r:id="rId7"/>
-    <p:sldId id="261" r:id="rId8"/>
-    <p:sldId id="262" r:id="rId9"/>
-    <p:sldId id="263" r:id="rId10"/>
+    <p:sldId id="264" r:id="rId8"/>
+    <p:sldId id="265" r:id="rId9"/>
+    <p:sldId id="266" r:id="rId10"/>
+    <p:sldId id="262" r:id="rId11"/>
+    <p:sldId id="267" r:id="rId12"/>
+    <p:sldId id="268" r:id="rId13"/>
+    <p:sldId id="263" r:id="rId14"/>
   </p:sldIdLst>
   <p:sldSz cx="12192000" cy="6858000"/>
   <p:notesSz cx="7772400" cy="10058400"/>
@@ -112,7 +119,361 @@
       </a:defRPr>
     </a:lvl9pPr>
   </p:defaultTextStyle>
+  <p:extLst>
+    <p:ext uri="{EFAFB233-063F-42B5-8137-9DF3F51BA10A}">
+      <p15:sldGuideLst xmlns:p15="http://schemas.microsoft.com/office/powerpoint/2012/main"/>
+    </p:ext>
+  </p:extLst>
 </p:presentation>
+</file>
+
+<file path=ppt/notesMasters/notesMaster1.xml><?xml version="1.0" encoding="utf-8"?>
+<p:notesMaster xmlns:a="http://schemas.openxmlformats.org/drawingml/2006/main" xmlns:r="http://schemas.openxmlformats.org/officeDocument/2006/relationships" xmlns:p="http://schemas.openxmlformats.org/presentationml/2006/main">
+  <p:cSld>
+    <p:bg>
+      <p:bgRef idx="1001">
+        <a:schemeClr val="bg1"/>
+      </p:bgRef>
+    </p:bg>
+    <p:spTree>
+      <p:nvGrpSpPr>
+        <p:cNvPr id="1" name=""/>
+        <p:cNvGrpSpPr/>
+        <p:nvPr/>
+      </p:nvGrpSpPr>
+      <p:grpSpPr>
+        <a:xfrm>
+          <a:off x="0" y="0"/>
+          <a:ext cx="0" cy="0"/>
+          <a:chOff x="0" y="0"/>
+          <a:chExt cx="0" cy="0"/>
+        </a:xfrm>
+      </p:grpSpPr>
+      <p:sp>
+        <p:nvSpPr>
+          <p:cNvPr id="2" name="Header Placeholder 1"/>
+          <p:cNvSpPr>
+            <a:spLocks noGrp="1"/>
+          </p:cNvSpPr>
+          <p:nvPr>
+            <p:ph type="hdr" sz="quarter"/>
+          </p:nvPr>
+        </p:nvSpPr>
+        <p:spPr>
+          <a:xfrm>
+            <a:off x="0" y="0"/>
+            <a:ext cx="3368675" cy="504825"/>
+          </a:xfrm>
+          <a:prstGeom prst="rect">
+            <a:avLst/>
+          </a:prstGeom>
+        </p:spPr>
+        <p:txBody>
+          <a:bodyPr vert="horz" lIns="91440" tIns="45720" rIns="91440" bIns="45720" rtlCol="0"/>
+          <a:lstStyle>
+            <a:lvl1pPr algn="l">
+              <a:defRPr sz="1200"/>
+            </a:lvl1pPr>
+          </a:lstStyle>
+          <a:p>
+            <a:endParaRPr lang="en-US"/>
+          </a:p>
+        </p:txBody>
+      </p:sp>
+      <p:sp>
+        <p:nvSpPr>
+          <p:cNvPr id="3" name="Date Placeholder 2"/>
+          <p:cNvSpPr>
+            <a:spLocks noGrp="1"/>
+          </p:cNvSpPr>
+          <p:nvPr>
+            <p:ph type="dt" idx="1"/>
+          </p:nvPr>
+        </p:nvSpPr>
+        <p:spPr>
+          <a:xfrm>
+            <a:off x="4402138" y="0"/>
+            <a:ext cx="3368675" cy="504825"/>
+          </a:xfrm>
+          <a:prstGeom prst="rect">
+            <a:avLst/>
+          </a:prstGeom>
+        </p:spPr>
+        <p:txBody>
+          <a:bodyPr vert="horz" lIns="91440" tIns="45720" rIns="91440" bIns="45720" rtlCol="0"/>
+          <a:lstStyle>
+            <a:lvl1pPr algn="r">
+              <a:defRPr sz="1200"/>
+            </a:lvl1pPr>
+          </a:lstStyle>
+          <a:p>
+            <a:fld id="{00BD23E7-6540-4C2C-A839-D8B7C873A27C}" type="datetimeFigureOut">
+              <a:rPr lang="en-US" smtClean="0"/>
+              <a:t>12/1/2018</a:t>
+            </a:fld>
+            <a:endParaRPr lang="en-US"/>
+          </a:p>
+        </p:txBody>
+      </p:sp>
+      <p:sp>
+        <p:nvSpPr>
+          <p:cNvPr id="4" name="Slide Image Placeholder 3"/>
+          <p:cNvSpPr>
+            <a:spLocks noGrp="1" noRot="1" noChangeAspect="1"/>
+          </p:cNvSpPr>
+          <p:nvPr>
+            <p:ph type="sldImg" idx="2"/>
+          </p:nvPr>
+        </p:nvSpPr>
+        <p:spPr>
+          <a:xfrm>
+            <a:off x="869950" y="1257300"/>
+            <a:ext cx="6032500" cy="3394075"/>
+          </a:xfrm>
+          <a:prstGeom prst="rect">
+            <a:avLst/>
+          </a:prstGeom>
+          <a:noFill/>
+          <a:ln w="12700">
+            <a:solidFill>
+              <a:prstClr val="black"/>
+            </a:solidFill>
+          </a:ln>
+        </p:spPr>
+        <p:txBody>
+          <a:bodyPr vert="horz" lIns="91440" tIns="45720" rIns="91440" bIns="45720" rtlCol="0" anchor="ctr"/>
+          <a:lstStyle/>
+          <a:p>
+            <a:endParaRPr lang="en-US"/>
+          </a:p>
+        </p:txBody>
+      </p:sp>
+      <p:sp>
+        <p:nvSpPr>
+          <p:cNvPr id="5" name="Notes Placeholder 4"/>
+          <p:cNvSpPr>
+            <a:spLocks noGrp="1"/>
+          </p:cNvSpPr>
+          <p:nvPr>
+            <p:ph type="body" sz="quarter" idx="3"/>
+          </p:nvPr>
+        </p:nvSpPr>
+        <p:spPr>
+          <a:xfrm>
+            <a:off x="777875" y="4840288"/>
+            <a:ext cx="6216650" cy="3960812"/>
+          </a:xfrm>
+          <a:prstGeom prst="rect">
+            <a:avLst/>
+          </a:prstGeom>
+        </p:spPr>
+        <p:txBody>
+          <a:bodyPr vert="horz" lIns="91440" tIns="45720" rIns="91440" bIns="45720" rtlCol="0"/>
+          <a:lstStyle/>
+          <a:p>
+            <a:pPr lvl="0"/>
+            <a:r>
+              <a:rPr lang="en-US"/>
+              <a:t>Edit Master text styles</a:t>
+            </a:r>
+          </a:p>
+          <a:p>
+            <a:pPr lvl="1"/>
+            <a:r>
+              <a:rPr lang="en-US"/>
+              <a:t>Second level</a:t>
+            </a:r>
+          </a:p>
+          <a:p>
+            <a:pPr lvl="2"/>
+            <a:r>
+              <a:rPr lang="en-US"/>
+              <a:t>Third level</a:t>
+            </a:r>
+          </a:p>
+          <a:p>
+            <a:pPr lvl="3"/>
+            <a:r>
+              <a:rPr lang="en-US"/>
+              <a:t>Fourth level</a:t>
+            </a:r>
+          </a:p>
+          <a:p>
+            <a:pPr lvl="4"/>
+            <a:r>
+              <a:rPr lang="en-US"/>
+              <a:t>Fifth level</a:t>
+            </a:r>
+          </a:p>
+        </p:txBody>
+      </p:sp>
+      <p:sp>
+        <p:nvSpPr>
+          <p:cNvPr id="6" name="Footer Placeholder 5"/>
+          <p:cNvSpPr>
+            <a:spLocks noGrp="1"/>
+          </p:cNvSpPr>
+          <p:nvPr>
+            <p:ph type="ftr" sz="quarter" idx="4"/>
+          </p:nvPr>
+        </p:nvSpPr>
+        <p:spPr>
+          <a:xfrm>
+            <a:off x="0" y="9553575"/>
+            <a:ext cx="3368675" cy="504825"/>
+          </a:xfrm>
+          <a:prstGeom prst="rect">
+            <a:avLst/>
+          </a:prstGeom>
+        </p:spPr>
+        <p:txBody>
+          <a:bodyPr vert="horz" lIns="91440" tIns="45720" rIns="91440" bIns="45720" rtlCol="0" anchor="b"/>
+          <a:lstStyle>
+            <a:lvl1pPr algn="l">
+              <a:defRPr sz="1200"/>
+            </a:lvl1pPr>
+          </a:lstStyle>
+          <a:p>
+            <a:endParaRPr lang="en-US"/>
+          </a:p>
+        </p:txBody>
+      </p:sp>
+      <p:sp>
+        <p:nvSpPr>
+          <p:cNvPr id="7" name="Slide Number Placeholder 6"/>
+          <p:cNvSpPr>
+            <a:spLocks noGrp="1"/>
+          </p:cNvSpPr>
+          <p:nvPr>
+            <p:ph type="sldNum" sz="quarter" idx="5"/>
+          </p:nvPr>
+        </p:nvSpPr>
+        <p:spPr>
+          <a:xfrm>
+            <a:off x="4402138" y="9553575"/>
+            <a:ext cx="3368675" cy="504825"/>
+          </a:xfrm>
+          <a:prstGeom prst="rect">
+            <a:avLst/>
+          </a:prstGeom>
+        </p:spPr>
+        <p:txBody>
+          <a:bodyPr vert="horz" lIns="91440" tIns="45720" rIns="91440" bIns="45720" rtlCol="0" anchor="b"/>
+          <a:lstStyle>
+            <a:lvl1pPr algn="r">
+              <a:defRPr sz="1200"/>
+            </a:lvl1pPr>
+          </a:lstStyle>
+          <a:p>
+            <a:fld id="{AFA52EE8-9F58-4071-B24F-CAEAFF77E153}" type="slidenum">
+              <a:rPr lang="en-US" smtClean="0"/>
+              <a:t>‹#›</a:t>
+            </a:fld>
+            <a:endParaRPr lang="en-US"/>
+          </a:p>
+        </p:txBody>
+      </p:sp>
+    </p:spTree>
+    <p:extLst>
+      <p:ext uri="{BB962C8B-B14F-4D97-AF65-F5344CB8AC3E}">
+        <p14:creationId xmlns:p14="http://schemas.microsoft.com/office/powerpoint/2010/main" val="8489953"/>
+      </p:ext>
+    </p:extLst>
+  </p:cSld>
+  <p:clrMap bg1="lt1" tx1="dk1" bg2="lt2" tx2="dk2" accent1="accent1" accent2="accent2" accent3="accent3" accent4="accent4" accent5="accent5" accent6="accent6" hlink="hlink" folHlink="folHlink"/>
+  <p:notesStyle>
+    <a:lvl1pPr marL="0" algn="l" defTabSz="914400" rtl="0" eaLnBrk="1" latinLnBrk="0" hangingPunct="1">
+      <a:defRPr sz="1200" kern="1200">
+        <a:solidFill>
+          <a:schemeClr val="tx1"/>
+        </a:solidFill>
+        <a:latin typeface="+mn-lt"/>
+        <a:ea typeface="+mn-ea"/>
+        <a:cs typeface="+mn-cs"/>
+      </a:defRPr>
+    </a:lvl1pPr>
+    <a:lvl2pPr marL="457200" algn="l" defTabSz="914400" rtl="0" eaLnBrk="1" latinLnBrk="0" hangingPunct="1">
+      <a:defRPr sz="1200" kern="1200">
+        <a:solidFill>
+          <a:schemeClr val="tx1"/>
+        </a:solidFill>
+        <a:latin typeface="+mn-lt"/>
+        <a:ea typeface="+mn-ea"/>
+        <a:cs typeface="+mn-cs"/>
+      </a:defRPr>
+    </a:lvl2pPr>
+    <a:lvl3pPr marL="914400" algn="l" defTabSz="914400" rtl="0" eaLnBrk="1" latinLnBrk="0" hangingPunct="1">
+      <a:defRPr sz="1200" kern="1200">
+        <a:solidFill>
+          <a:schemeClr val="tx1"/>
+        </a:solidFill>
+        <a:latin typeface="+mn-lt"/>
+        <a:ea typeface="+mn-ea"/>
+        <a:cs typeface="+mn-cs"/>
+      </a:defRPr>
+    </a:lvl3pPr>
+    <a:lvl4pPr marL="1371600" algn="l" defTabSz="914400" rtl="0" eaLnBrk="1" latinLnBrk="0" hangingPunct="1">
+      <a:defRPr sz="1200" kern="1200">
+        <a:solidFill>
+          <a:schemeClr val="tx1"/>
+        </a:solidFill>
+        <a:latin typeface="+mn-lt"/>
+        <a:ea typeface="+mn-ea"/>
+        <a:cs typeface="+mn-cs"/>
+      </a:defRPr>
+    </a:lvl4pPr>
+    <a:lvl5pPr marL="1828800" algn="l" defTabSz="914400" rtl="0" eaLnBrk="1" latinLnBrk="0" hangingPunct="1">
+      <a:defRPr sz="1200" kern="1200">
+        <a:solidFill>
+          <a:schemeClr val="tx1"/>
+        </a:solidFill>
+        <a:latin typeface="+mn-lt"/>
+        <a:ea typeface="+mn-ea"/>
+        <a:cs typeface="+mn-cs"/>
+      </a:defRPr>
+    </a:lvl5pPr>
+    <a:lvl6pPr marL="2286000" algn="l" defTabSz="914400" rtl="0" eaLnBrk="1" latinLnBrk="0" hangingPunct="1">
+      <a:defRPr sz="1200" kern="1200">
+        <a:solidFill>
+          <a:schemeClr val="tx1"/>
+        </a:solidFill>
+        <a:latin typeface="+mn-lt"/>
+        <a:ea typeface="+mn-ea"/>
+        <a:cs typeface="+mn-cs"/>
+      </a:defRPr>
+    </a:lvl6pPr>
+    <a:lvl7pPr marL="2743200" algn="l" defTabSz="914400" rtl="0" eaLnBrk="1" latinLnBrk="0" hangingPunct="1">
+      <a:defRPr sz="1200" kern="1200">
+        <a:solidFill>
+          <a:schemeClr val="tx1"/>
+        </a:solidFill>
+        <a:latin typeface="+mn-lt"/>
+        <a:ea typeface="+mn-ea"/>
+        <a:cs typeface="+mn-cs"/>
+      </a:defRPr>
+    </a:lvl7pPr>
+    <a:lvl8pPr marL="3200400" algn="l" defTabSz="914400" rtl="0" eaLnBrk="1" latinLnBrk="0" hangingPunct="1">
+      <a:defRPr sz="1200" kern="1200">
+        <a:solidFill>
+          <a:schemeClr val="tx1"/>
+        </a:solidFill>
+        <a:latin typeface="+mn-lt"/>
+        <a:ea typeface="+mn-ea"/>
+        <a:cs typeface="+mn-cs"/>
+      </a:defRPr>
+    </a:lvl8pPr>
+    <a:lvl9pPr marL="3657600" algn="l" defTabSz="914400" rtl="0" eaLnBrk="1" latinLnBrk="0" hangingPunct="1">
+      <a:defRPr sz="1200" kern="1200">
+        <a:solidFill>
+          <a:schemeClr val="tx1"/>
+        </a:solidFill>
+        <a:latin typeface="+mn-lt"/>
+        <a:ea typeface="+mn-ea"/>
+        <a:cs typeface="+mn-cs"/>
+      </a:defRPr>
+    </a:lvl9pPr>
+  </p:notesStyle>
+</p:notesMaster>
 </file>
 
 <file path=ppt/slideLayouts/slideLayout1.xml><?xml version="1.0" encoding="utf-8"?>
@@ -3417,7 +3778,7 @@
                 </a:solidFill>
                 <a:latin typeface="Century Gothic"/>
               </a:rPr>
-              <a:t>11/30/2018</a:t>
+              <a:t>12/1/2018</a:t>
             </a:fld>
             <a:endParaRPr lang="en-US" sz="1100" b="0" strike="noStrike" spc="-1">
               <a:latin typeface="Times New Roman"/>
@@ -4241,7 +4602,7 @@
                 </a:solidFill>
                 <a:latin typeface="Century Gothic"/>
               </a:rPr>
-              <a:t>11/30/2018</a:t>
+              <a:t>12/1/2018</a:t>
             </a:fld>
             <a:endParaRPr lang="en-US" sz="1100" b="0" strike="noStrike" spc="-1">
               <a:latin typeface="Times New Roman"/>
@@ -4976,16 +5337,7 @@
                 </a:solidFill>
                 <a:latin typeface="Century Gothic"/>
               </a:rPr>
-              <a:t>By Brian Kilburn and </a:t>
-            </a:r>
-            <a:r>
-              <a:rPr lang="en-US" sz="2000" b="0" strike="noStrike" cap="all" spc="-1" dirty="0" smtClean="0">
-                <a:solidFill>
-                  <a:srgbClr val="8AD0D6"/>
-                </a:solidFill>
-                <a:latin typeface="Century Gothic"/>
-              </a:rPr>
-              <a:t>Aaron Voynar</a:t>
+              <a:t>By Brian Kilburn and Aaron Voynar</a:t>
             </a:r>
             <a:endParaRPr lang="en-US" sz="2000" b="0" strike="noStrike" spc="-1" dirty="0">
               <a:latin typeface="Arial"/>
@@ -5033,6 +5385,458 @@
           </a:effectRef>
           <a:fontRef idx="minor"/>
         </p:style>
+      </p:sp>
+    </p:spTree>
+  </p:cSld>
+  <p:clrMapOvr>
+    <a:masterClrMapping/>
+  </p:clrMapOvr>
+  <p:timing>
+    <p:tnLst>
+      <p:par>
+        <p:cTn id="1" dur="indefinite" restart="never" nodeType="tmRoot">
+          <p:childTnLst>
+            <p:seq>
+              <p:cTn id="2" dur="indefinite" nodeType="mainSeq"/>
+              <p:prevCondLst>
+                <p:cond evt="onPrev" delay="0">
+                  <p:tgtEl>
+                    <p:sldTgt/>
+                  </p:tgtEl>
+                </p:cond>
+              </p:prevCondLst>
+              <p:nextCondLst>
+                <p:cond evt="onNext" delay="0">
+                  <p:tgtEl>
+                    <p:sldTgt/>
+                  </p:tgtEl>
+                </p:cond>
+              </p:nextCondLst>
+            </p:seq>
+          </p:childTnLst>
+        </p:cTn>
+      </p:par>
+    </p:tnLst>
+  </p:timing>
+</p:sld>
+</file>
+
+<file path=ppt/slides/slide10.xml><?xml version="1.0" encoding="utf-8"?>
+<p:sld xmlns:a="http://schemas.openxmlformats.org/drawingml/2006/main" xmlns:r="http://schemas.openxmlformats.org/officeDocument/2006/relationships" xmlns:p="http://schemas.openxmlformats.org/presentationml/2006/main">
+  <p:cSld>
+    <p:spTree>
+      <p:nvGrpSpPr>
+        <p:cNvPr id="1" name=""/>
+        <p:cNvGrpSpPr/>
+        <p:nvPr/>
+      </p:nvGrpSpPr>
+      <p:grpSpPr>
+        <a:xfrm>
+          <a:off x="0" y="0"/>
+          <a:ext cx="0" cy="0"/>
+          <a:chOff x="0" y="0"/>
+          <a:chExt cx="0" cy="0"/>
+        </a:xfrm>
+      </p:grpSpPr>
+      <p:sp>
+        <p:nvSpPr>
+          <p:cNvPr id="109" name="TextShape 1"/>
+          <p:cNvSpPr txBox="1"/>
+          <p:nvPr/>
+        </p:nvSpPr>
+        <p:spPr>
+          <a:xfrm>
+            <a:off x="1097280" y="2011680"/>
+            <a:ext cx="3931920" cy="305280"/>
+          </a:xfrm>
+          <a:prstGeom prst="rect">
+            <a:avLst/>
+          </a:prstGeom>
+          <a:noFill/>
+          <a:ln>
+            <a:noFill/>
+          </a:ln>
+        </p:spPr>
+      </p:sp>
+      <p:sp>
+        <p:nvSpPr>
+          <p:cNvPr id="110" name="TextShape 2"/>
+          <p:cNvSpPr txBox="1"/>
+          <p:nvPr/>
+        </p:nvSpPr>
+        <p:spPr>
+          <a:xfrm>
+            <a:off x="984985" y="401992"/>
+            <a:ext cx="7406640" cy="1041480"/>
+          </a:xfrm>
+          <a:prstGeom prst="rect">
+            <a:avLst/>
+          </a:prstGeom>
+          <a:noFill/>
+          <a:ln>
+            <a:noFill/>
+          </a:ln>
+        </p:spPr>
+        <p:txBody>
+          <a:bodyPr lIns="90000" tIns="45000" rIns="90000" bIns="45000"/>
+          <a:lstStyle/>
+          <a:p>
+            <a:r>
+              <a:rPr lang="en-US" sz="4000" spc="-1" dirty="0">
+                <a:solidFill>
+                  <a:srgbClr val="FFFFFF"/>
+                </a:solidFill>
+                <a:latin typeface="Arial"/>
+              </a:rPr>
+              <a:t>System Insights</a:t>
+            </a:r>
+            <a:endParaRPr lang="en-US" sz="4000" b="0" strike="noStrike" spc="-1" dirty="0">
+              <a:solidFill>
+                <a:srgbClr val="FFFFFF"/>
+              </a:solidFill>
+              <a:latin typeface="Arial"/>
+            </a:endParaRPr>
+          </a:p>
+        </p:txBody>
+      </p:sp>
+      <p:pic>
+        <p:nvPicPr>
+          <p:cNvPr id="5" name="Picture 4" descr="System Insights extension in Windows Admin Center, showing CPU capacity forecasting capability with a graph plotting the forecast">
+            <a:extLst>
+              <a:ext uri="{FF2B5EF4-FFF2-40B4-BE49-F238E27FC236}">
+                <a16:creationId xmlns:a16="http://schemas.microsoft.com/office/drawing/2014/main" id="{6090A5E2-0789-4EFD-B063-60E24F17FC8A}"/>
+              </a:ext>
+            </a:extLst>
+          </p:cNvPr>
+          <p:cNvPicPr/>
+          <p:nvPr/>
+        </p:nvPicPr>
+        <p:blipFill>
+          <a:blip r:embed="rId2">
+            <a:extLst>
+              <a:ext uri="{28A0092B-C50C-407E-A947-70E740481C1C}">
+                <a14:useLocalDpi xmlns:a14="http://schemas.microsoft.com/office/drawing/2010/main" val="0"/>
+              </a:ext>
+            </a:extLst>
+          </a:blip>
+          <a:srcRect/>
+          <a:stretch>
+            <a:fillRect/>
+          </a:stretch>
+        </p:blipFill>
+        <p:spPr bwMode="auto">
+          <a:xfrm>
+            <a:off x="1383323" y="1757362"/>
+            <a:ext cx="9509265" cy="4306554"/>
+          </a:xfrm>
+          <a:prstGeom prst="rect">
+            <a:avLst/>
+          </a:prstGeom>
+          <a:noFill/>
+          <a:ln>
+            <a:noFill/>
+          </a:ln>
+        </p:spPr>
+      </p:pic>
+    </p:spTree>
+    <p:extLst>
+      <p:ext uri="{BB962C8B-B14F-4D97-AF65-F5344CB8AC3E}">
+        <p14:creationId xmlns:p14="http://schemas.microsoft.com/office/powerpoint/2010/main" val="3784586122"/>
+      </p:ext>
+    </p:extLst>
+  </p:cSld>
+  <p:clrMapOvr>
+    <a:masterClrMapping/>
+  </p:clrMapOvr>
+  <p:timing>
+    <p:tnLst>
+      <p:par>
+        <p:cTn id="1" dur="indefinite" restart="never" nodeType="tmRoot">
+          <p:childTnLst>
+            <p:seq>
+              <p:cTn id="2" dur="indefinite" nodeType="mainSeq"/>
+              <p:prevCondLst>
+                <p:cond evt="onPrev" delay="0">
+                  <p:tgtEl>
+                    <p:sldTgt/>
+                  </p:tgtEl>
+                </p:cond>
+              </p:prevCondLst>
+              <p:nextCondLst>
+                <p:cond evt="onNext" delay="0">
+                  <p:tgtEl>
+                    <p:sldTgt/>
+                  </p:tgtEl>
+                </p:cond>
+              </p:nextCondLst>
+            </p:seq>
+          </p:childTnLst>
+        </p:cTn>
+      </p:par>
+    </p:tnLst>
+  </p:timing>
+</p:sld>
+</file>
+
+<file path=ppt/slides/slide11.xml><?xml version="1.0" encoding="utf-8"?>
+<p:sld xmlns:a="http://schemas.openxmlformats.org/drawingml/2006/main" xmlns:r="http://schemas.openxmlformats.org/officeDocument/2006/relationships" xmlns:p="http://schemas.openxmlformats.org/presentationml/2006/main">
+  <p:cSld>
+    <p:spTree>
+      <p:nvGrpSpPr>
+        <p:cNvPr id="1" name=""/>
+        <p:cNvGrpSpPr/>
+        <p:nvPr/>
+      </p:nvGrpSpPr>
+      <p:grpSpPr>
+        <a:xfrm>
+          <a:off x="0" y="0"/>
+          <a:ext cx="0" cy="0"/>
+          <a:chOff x="0" y="0"/>
+          <a:chExt cx="0" cy="0"/>
+        </a:xfrm>
+      </p:grpSpPr>
+      <p:sp>
+        <p:nvSpPr>
+          <p:cNvPr id="109" name="TextShape 1"/>
+          <p:cNvSpPr txBox="1"/>
+          <p:nvPr/>
+        </p:nvSpPr>
+        <p:spPr>
+          <a:xfrm>
+            <a:off x="1097280" y="2011680"/>
+            <a:ext cx="3931920" cy="305280"/>
+          </a:xfrm>
+          <a:prstGeom prst="rect">
+            <a:avLst/>
+          </a:prstGeom>
+          <a:noFill/>
+          <a:ln>
+            <a:noFill/>
+          </a:ln>
+        </p:spPr>
+      </p:sp>
+      <p:sp>
+        <p:nvSpPr>
+          <p:cNvPr id="110" name="TextShape 2"/>
+          <p:cNvSpPr txBox="1"/>
+          <p:nvPr/>
+        </p:nvSpPr>
+        <p:spPr>
+          <a:xfrm>
+            <a:off x="1097280" y="401992"/>
+            <a:ext cx="7406640" cy="1041480"/>
+          </a:xfrm>
+          <a:prstGeom prst="rect">
+            <a:avLst/>
+          </a:prstGeom>
+          <a:noFill/>
+          <a:ln>
+            <a:noFill/>
+          </a:ln>
+        </p:spPr>
+        <p:txBody>
+          <a:bodyPr lIns="90000" tIns="45000" rIns="90000" bIns="45000"/>
+          <a:lstStyle/>
+          <a:p>
+            <a:r>
+              <a:rPr lang="en-US" sz="4000" spc="-1" dirty="0">
+                <a:solidFill>
+                  <a:srgbClr val="FFFFFF"/>
+                </a:solidFill>
+                <a:latin typeface="Arial"/>
+              </a:rPr>
+              <a:t>Storage Migration Features</a:t>
+            </a:r>
+            <a:endParaRPr lang="en-US" sz="4000" b="0" strike="noStrike" spc="-1" dirty="0">
+              <a:solidFill>
+                <a:srgbClr val="FFFFFF"/>
+              </a:solidFill>
+              <a:latin typeface="Arial"/>
+            </a:endParaRPr>
+          </a:p>
+        </p:txBody>
+      </p:sp>
+      <p:sp>
+        <p:nvSpPr>
+          <p:cNvPr id="2" name="TextBox 1">
+            <a:extLst>
+              <a:ext uri="{FF2B5EF4-FFF2-40B4-BE49-F238E27FC236}">
+                <a16:creationId xmlns:a16="http://schemas.microsoft.com/office/drawing/2014/main" id="{0671EFFB-B819-4FE0-AA2E-2201D3CA6913}"/>
+              </a:ext>
+            </a:extLst>
+          </p:cNvPr>
+          <p:cNvSpPr txBox="1"/>
+          <p:nvPr/>
+        </p:nvSpPr>
+        <p:spPr>
+          <a:xfrm>
+            <a:off x="2093843" y="2411896"/>
+            <a:ext cx="8413736" cy="1200329"/>
+          </a:xfrm>
+          <a:prstGeom prst="rect">
+            <a:avLst/>
+          </a:prstGeom>
+          <a:noFill/>
+        </p:spPr>
+        <p:txBody>
+          <a:bodyPr wrap="square" rtlCol="0">
+            <a:spAutoFit/>
+          </a:bodyPr>
+          <a:lstStyle/>
+          <a:p>
+            <a:pPr marL="285750" indent="-285750">
+              <a:buFont typeface="Arial" panose="020B0604020202020204" pitchFamily="34" charset="0"/>
+              <a:buChar char="•"/>
+            </a:pPr>
+            <a:r>
+              <a:rPr lang="en-US" sz="2400" dirty="0">
+                <a:solidFill>
+                  <a:schemeClr val="bg1"/>
+                </a:solidFill>
+              </a:rPr>
+              <a:t>Transfer of Data from legacy systems to WS2019</a:t>
+            </a:r>
+          </a:p>
+          <a:p>
+            <a:pPr marL="285750" indent="-285750">
+              <a:buFont typeface="Arial" panose="020B0604020202020204" pitchFamily="34" charset="0"/>
+              <a:buChar char="•"/>
+            </a:pPr>
+            <a:endParaRPr lang="en-US" sz="2400" dirty="0">
+              <a:solidFill>
+                <a:schemeClr val="bg1"/>
+              </a:solidFill>
+            </a:endParaRPr>
+          </a:p>
+          <a:p>
+            <a:pPr marL="285750" indent="-285750">
+              <a:buFont typeface="Arial" panose="020B0604020202020204" pitchFamily="34" charset="0"/>
+              <a:buChar char="•"/>
+            </a:pPr>
+            <a:r>
+              <a:rPr lang="en-US" sz="2400" dirty="0">
+                <a:solidFill>
+                  <a:schemeClr val="bg1"/>
+                </a:solidFill>
+              </a:rPr>
+              <a:t>easy setup of a point-to-point VPN to the Azure services</a:t>
+            </a:r>
+          </a:p>
+        </p:txBody>
+      </p:sp>
+    </p:spTree>
+    <p:extLst>
+      <p:ext uri="{BB962C8B-B14F-4D97-AF65-F5344CB8AC3E}">
+        <p14:creationId xmlns:p14="http://schemas.microsoft.com/office/powerpoint/2010/main" val="1451327862"/>
+      </p:ext>
+    </p:extLst>
+  </p:cSld>
+  <p:clrMapOvr>
+    <a:masterClrMapping/>
+  </p:clrMapOvr>
+  <p:timing>
+    <p:tnLst>
+      <p:par>
+        <p:cTn id="1" dur="indefinite" restart="never" nodeType="tmRoot">
+          <p:childTnLst>
+            <p:seq>
+              <p:cTn id="2" dur="indefinite" nodeType="mainSeq"/>
+              <p:prevCondLst>
+                <p:cond evt="onPrev" delay="0">
+                  <p:tgtEl>
+                    <p:sldTgt/>
+                  </p:tgtEl>
+                </p:cond>
+              </p:prevCondLst>
+              <p:nextCondLst>
+                <p:cond evt="onNext" delay="0">
+                  <p:tgtEl>
+                    <p:sldTgt/>
+                  </p:tgtEl>
+                </p:cond>
+              </p:nextCondLst>
+            </p:seq>
+          </p:childTnLst>
+        </p:cTn>
+      </p:par>
+    </p:tnLst>
+  </p:timing>
+</p:sld>
+</file>
+
+<file path=ppt/slides/slide12.xml><?xml version="1.0" encoding="utf-8"?>
+<p:sld xmlns:a="http://schemas.openxmlformats.org/drawingml/2006/main" xmlns:r="http://schemas.openxmlformats.org/officeDocument/2006/relationships" xmlns:p="http://schemas.openxmlformats.org/presentationml/2006/main">
+  <p:cSld>
+    <p:spTree>
+      <p:nvGrpSpPr>
+        <p:cNvPr id="1" name=""/>
+        <p:cNvGrpSpPr/>
+        <p:nvPr/>
+      </p:nvGrpSpPr>
+      <p:grpSpPr>
+        <a:xfrm>
+          <a:off x="0" y="0"/>
+          <a:ext cx="0" cy="0"/>
+          <a:chOff x="0" y="0"/>
+          <a:chExt cx="0" cy="0"/>
+        </a:xfrm>
+      </p:grpSpPr>
+      <p:sp>
+        <p:nvSpPr>
+          <p:cNvPr id="111" name="CustomShape 1"/>
+          <p:cNvSpPr/>
+          <p:nvPr/>
+        </p:nvSpPr>
+        <p:spPr>
+          <a:xfrm>
+            <a:off x="396720" y="3213720"/>
+            <a:ext cx="11683800" cy="579240"/>
+          </a:xfrm>
+          <a:prstGeom prst="rect">
+            <a:avLst/>
+          </a:prstGeom>
+          <a:noFill/>
+          <a:ln>
+            <a:noFill/>
+          </a:ln>
+        </p:spPr>
+        <p:style>
+          <a:lnRef idx="0">
+            <a:scrgbClr r="0" g="0" b="0"/>
+          </a:lnRef>
+          <a:fillRef idx="0">
+            <a:scrgbClr r="0" g="0" b="0"/>
+          </a:fillRef>
+          <a:effectRef idx="0">
+            <a:scrgbClr r="0" g="0" b="0"/>
+          </a:effectRef>
+          <a:fontRef idx="minor"/>
+        </p:style>
+        <p:txBody>
+          <a:bodyPr/>
+          <a:lstStyle/>
+          <a:p>
+            <a:pPr algn="ctr">
+              <a:lnSpc>
+                <a:spcPct val="100000"/>
+              </a:lnSpc>
+            </a:pPr>
+            <a:r>
+              <a:rPr lang="en-US" sz="3200" b="1" u="sng" strike="noStrike" spc="-1">
+                <a:solidFill>
+                  <a:srgbClr val="266662"/>
+                </a:solidFill>
+                <a:uFillTx/>
+                <a:latin typeface="Century Gothic"/>
+                <a:hlinkClick r:id="rId2"/>
+              </a:rPr>
+              <a:t>https://www.youtube.com/watch?v=3wvTYbnXyB4</a:t>
+            </a:r>
+            <a:endParaRPr lang="en-US" sz="3200" b="0" strike="noStrike" spc="-1">
+              <a:latin typeface="Arial"/>
+            </a:endParaRPr>
+          </a:p>
+        </p:txBody>
       </p:sp>
     </p:spTree>
   </p:cSld>
@@ -5220,7 +6024,7 @@
           <a:lstStyle/>
           <a:p>
             <a:r>
-              <a:rPr lang="en-US" sz="4000" b="0" strike="noStrike" spc="-1">
+              <a:rPr lang="en-US" sz="4000" b="0" strike="noStrike" spc="-1" dirty="0">
                 <a:solidFill>
                   <a:srgbClr val="FFFFFF"/>
                 </a:solidFill>
@@ -5230,7 +6034,7 @@
             </a:r>
           </a:p>
           <a:p>
-            <a:endParaRPr lang="en-US" sz="4000" b="0" strike="noStrike" spc="-1">
+            <a:endParaRPr lang="en-US" sz="4000" b="0" strike="noStrike" spc="-1" dirty="0">
               <a:solidFill>
                 <a:srgbClr val="FFFFFF"/>
               </a:solidFill>
@@ -5238,7 +6042,7 @@
             </a:endParaRPr>
           </a:p>
           <a:p>
-            <a:endParaRPr lang="en-US" sz="4000" b="0" strike="noStrike" spc="-1">
+            <a:endParaRPr lang="en-US" sz="4000" b="0" strike="noStrike" spc="-1" dirty="0">
               <a:solidFill>
                 <a:srgbClr val="FFFFFF"/>
               </a:solidFill>
@@ -5468,7 +6272,7 @@
           <a:lstStyle/>
           <a:p>
             <a:r>
-              <a:rPr lang="en-US" sz="4000" b="0" strike="noStrike" spc="-1">
+              <a:rPr lang="en-US" sz="4000" b="0" strike="noStrike" spc="-1" dirty="0">
                 <a:solidFill>
                   <a:srgbClr val="FFFFFF"/>
                 </a:solidFill>
@@ -5478,7 +6282,7 @@
             </a:r>
           </a:p>
           <a:p>
-            <a:endParaRPr lang="en-US" sz="4000" b="0" strike="noStrike" spc="-1">
+            <a:endParaRPr lang="en-US" sz="4000" b="0" strike="noStrike" spc="-1" dirty="0">
               <a:solidFill>
                 <a:srgbClr val="FFFFFF"/>
               </a:solidFill>
@@ -5486,7 +6290,7 @@
             </a:endParaRPr>
           </a:p>
           <a:p>
-            <a:endParaRPr lang="en-US" sz="4000" b="0" strike="noStrike" spc="-1">
+            <a:endParaRPr lang="en-US" sz="4000" b="0" strike="noStrike" spc="-1" dirty="0">
               <a:solidFill>
                 <a:srgbClr val="FFFFFF"/>
               </a:solidFill>
@@ -5862,7 +6666,7 @@
               <a:buChar char=""/>
             </a:pPr>
             <a:r>
-              <a:rPr lang="en-US" sz="2400" b="0" strike="noStrike" spc="-1">
+              <a:rPr lang="en-US" sz="2400" b="0" strike="noStrike" spc="-1" dirty="0">
                 <a:solidFill>
                   <a:srgbClr val="FFFFFF"/>
                 </a:solidFill>
@@ -5880,7 +6684,7 @@
               <a:buFont typeface="Symbol" charset="2"/>
               <a:buChar char=""/>
             </a:pPr>
-            <a:endParaRPr lang="en-US" sz="2400" b="0" strike="noStrike" spc="-1">
+            <a:endParaRPr lang="en-US" sz="2400" b="0" strike="noStrike" spc="-1" dirty="0">
               <a:solidFill>
                 <a:srgbClr val="FFFFFF"/>
               </a:solidFill>
@@ -5897,7 +6701,7 @@
               <a:buChar char=""/>
             </a:pPr>
             <a:r>
-              <a:rPr lang="en-US" sz="2400" b="0" strike="noStrike" spc="-1">
+              <a:rPr lang="en-US" sz="2400" b="0" strike="noStrike" spc="-1" dirty="0">
                 <a:solidFill>
                   <a:srgbClr val="FFFFFF"/>
                 </a:solidFill>
@@ -5915,7 +6719,7 @@
               <a:buFont typeface="Wingdings" charset="2"/>
               <a:buChar char=""/>
             </a:pPr>
-            <a:endParaRPr lang="en-US" sz="2400" b="0" strike="noStrike" spc="-1">
+            <a:endParaRPr lang="en-US" sz="2400" b="0" strike="noStrike" spc="-1" dirty="0">
               <a:solidFill>
                 <a:srgbClr val="FFFFFF"/>
               </a:solidFill>
@@ -5932,7 +6736,7 @@
               <a:buChar char=""/>
             </a:pPr>
             <a:r>
-              <a:rPr lang="en-US" sz="2400" b="0" strike="noStrike" spc="-1">
+              <a:rPr lang="en-US" sz="2400" b="0" strike="noStrike" spc="-1" dirty="0">
                 <a:solidFill>
                   <a:srgbClr val="FFFFFF"/>
                 </a:solidFill>
@@ -5950,7 +6754,7 @@
               <a:buFont typeface="Wingdings" charset="2"/>
               <a:buChar char=""/>
             </a:pPr>
-            <a:endParaRPr lang="en-US" sz="2400" b="0" strike="noStrike" spc="-1">
+            <a:endParaRPr lang="en-US" sz="2400" b="0" strike="noStrike" spc="-1" dirty="0">
               <a:solidFill>
                 <a:srgbClr val="FFFFFF"/>
               </a:solidFill>
@@ -5967,7 +6771,7 @@
               <a:buChar char=""/>
             </a:pPr>
             <a:r>
-              <a:rPr lang="en-US" sz="2400" b="0" strike="noStrike" spc="-1">
+              <a:rPr lang="en-US" sz="2400" b="0" strike="noStrike" spc="-1" dirty="0">
                 <a:solidFill>
                   <a:srgbClr val="FFFFFF"/>
                 </a:solidFill>
@@ -5985,7 +6789,7 @@
               <a:buFont typeface="Wingdings" charset="2"/>
               <a:buChar char=""/>
             </a:pPr>
-            <a:endParaRPr lang="en-US" sz="2400" b="0" strike="noStrike" spc="-1">
+            <a:endParaRPr lang="en-US" sz="2400" b="0" strike="noStrike" spc="-1" dirty="0">
               <a:solidFill>
                 <a:srgbClr val="FFFFFF"/>
               </a:solidFill>
@@ -6002,7 +6806,7 @@
               <a:buChar char=""/>
             </a:pPr>
             <a:r>
-              <a:rPr lang="en-US" sz="2400" b="0" strike="noStrike" spc="-1">
+              <a:rPr lang="en-US" sz="2400" b="0" strike="noStrike" spc="-1" dirty="0">
                 <a:solidFill>
                   <a:srgbClr val="FFFFFF"/>
                 </a:solidFill>
@@ -6020,7 +6824,7 @@
               <a:buFont typeface="Wingdings" charset="2"/>
               <a:buChar char=""/>
             </a:pPr>
-            <a:endParaRPr lang="en-US" sz="2400" b="0" strike="noStrike" spc="-1">
+            <a:endParaRPr lang="en-US" sz="2400" b="0" strike="noStrike" spc="-1" dirty="0">
               <a:solidFill>
                 <a:srgbClr val="FFFFFF"/>
               </a:solidFill>
@@ -6134,189 +6938,96 @@
       </p:grpSpPr>
       <p:sp>
         <p:nvSpPr>
-          <p:cNvPr id="106" name="TextShape 1"/>
+          <p:cNvPr id="2" name="Title 1">
+            <a:extLst>
+              <a:ext uri="{FF2B5EF4-FFF2-40B4-BE49-F238E27FC236}">
+                <a16:creationId xmlns:a16="http://schemas.microsoft.com/office/drawing/2014/main" id="{BBB87B1A-5515-4A04-A5AF-3BD4E4E4EC71}"/>
+              </a:ext>
+            </a:extLst>
+          </p:cNvPr>
+          <p:cNvSpPr>
+            <a:spLocks noGrp="1"/>
+          </p:cNvSpPr>
+          <p:nvPr>
+            <p:ph type="title"/>
+          </p:nvPr>
+        </p:nvSpPr>
+        <p:spPr/>
+        <p:txBody>
+          <a:bodyPr/>
+          <a:lstStyle/>
+          <a:p>
+            <a:r>
+              <a:rPr lang="en-US" dirty="0">
+                <a:solidFill>
+                  <a:schemeClr val="bg1"/>
+                </a:solidFill>
+              </a:rPr>
+              <a:t>AZURE SERVICES</a:t>
+            </a:r>
+          </a:p>
+        </p:txBody>
+      </p:sp>
+      <p:sp>
+        <p:nvSpPr>
+          <p:cNvPr id="5" name="TextBox 4">
+            <a:extLst>
+              <a:ext uri="{FF2B5EF4-FFF2-40B4-BE49-F238E27FC236}">
+                <a16:creationId xmlns:a16="http://schemas.microsoft.com/office/drawing/2014/main" id="{038322C4-46CA-4ABD-8051-097BB6D47A71}"/>
+              </a:ext>
+            </a:extLst>
+          </p:cNvPr>
           <p:cNvSpPr txBox="1"/>
           <p:nvPr/>
         </p:nvSpPr>
         <p:spPr>
           <a:xfrm>
-            <a:off x="1097280" y="2011680"/>
-            <a:ext cx="5303520" cy="663480"/>
+            <a:off x="2036748" y="2220053"/>
+            <a:ext cx="8710983" cy="830997"/>
           </a:xfrm>
           <a:prstGeom prst="rect">
             <a:avLst/>
           </a:prstGeom>
           <a:noFill/>
-          <a:ln>
-            <a:noFill/>
-          </a:ln>
-        </p:spPr>
-        <p:txBody>
-          <a:bodyPr lIns="90000" tIns="45000" rIns="90000" bIns="45000"/>
-          <a:lstStyle/>
-          <a:p>
-            <a:pPr marL="216000" indent="-216000">
-              <a:buClr>
-                <a:srgbClr val="000000"/>
-              </a:buClr>
-              <a:buSzPct val="45000"/>
-              <a:buFont typeface="Wingdings" charset="2"/>
-              <a:buChar char=""/>
+        </p:spPr>
+        <p:txBody>
+          <a:bodyPr wrap="square" rtlCol="0">
+            <a:spAutoFit/>
+          </a:bodyPr>
+          <a:lstStyle/>
+          <a:p>
+            <a:pPr marL="342900" indent="-342900">
+              <a:buFont typeface="Arial" panose="020B0604020202020204" pitchFamily="34" charset="0"/>
+              <a:buChar char="•"/>
             </a:pPr>
             <a:r>
-              <a:rPr lang="en-US" sz="2400" b="0" strike="noStrike" spc="-1">
+              <a:rPr lang="en-US" sz="2400" dirty="0">
                 <a:solidFill>
-                  <a:srgbClr val="FFFFFF"/>
+                  <a:schemeClr val="bg1"/>
                 </a:solidFill>
-                <a:latin typeface="Arial"/>
               </a:rPr>
-              <a:t>What is Hybrid Integration?</a:t>
+              <a:t>SaaS (Software as a Service)</a:t>
             </a:r>
           </a:p>
           <a:p>
-            <a:pPr marL="216000" indent="-216000">
-              <a:buClr>
-                <a:srgbClr val="000000"/>
-              </a:buClr>
-              <a:buSzPct val="45000"/>
-              <a:buFont typeface="Wingdings" charset="2"/>
-              <a:buChar char=""/>
-            </a:pPr>
-            <a:endParaRPr lang="en-US" sz="2400" b="0" strike="noStrike" spc="-1">
-              <a:solidFill>
-                <a:srgbClr val="FFFFFF"/>
-              </a:solidFill>
-              <a:latin typeface="Arial"/>
-            </a:endParaRPr>
-          </a:p>
-        </p:txBody>
-      </p:sp>
-      <p:sp>
-        <p:nvSpPr>
-          <p:cNvPr id="107" name="TextShape 2"/>
-          <p:cNvSpPr txBox="1"/>
-          <p:nvPr/>
-        </p:nvSpPr>
-        <p:spPr>
-          <a:xfrm>
-            <a:off x="3657600" y="640080"/>
-            <a:ext cx="4937760" cy="1517040"/>
-          </a:xfrm>
-          <a:prstGeom prst="rect">
-            <a:avLst/>
-          </a:prstGeom>
-          <a:noFill/>
-          <a:ln>
-            <a:noFill/>
-          </a:ln>
-        </p:spPr>
-        <p:txBody>
-          <a:bodyPr lIns="90000" tIns="45000" rIns="90000" bIns="45000"/>
-          <a:lstStyle/>
-          <a:p>
-            <a:r>
-              <a:rPr lang="en-US" sz="4000" b="0" strike="noStrike" spc="-1">
-                <a:solidFill>
-                  <a:srgbClr val="FFFFFF"/>
-                </a:solidFill>
-                <a:latin typeface="Arial"/>
-              </a:rPr>
-              <a:t>Hybrid Integration</a:t>
-            </a:r>
-          </a:p>
-          <a:p>
-            <a:endParaRPr lang="en-US" sz="4000" b="0" strike="noStrike" spc="-1">
-              <a:solidFill>
-                <a:srgbClr val="FFFFFF"/>
-              </a:solidFill>
-              <a:latin typeface="Arial"/>
-            </a:endParaRPr>
-          </a:p>
-          <a:p>
-            <a:endParaRPr lang="en-US" sz="4000" b="0" strike="noStrike" spc="-1">
-              <a:solidFill>
-                <a:srgbClr val="FFFFFF"/>
-              </a:solidFill>
-              <a:latin typeface="Arial"/>
-            </a:endParaRPr>
-          </a:p>
-        </p:txBody>
-      </p:sp>
-      <p:sp>
-        <p:nvSpPr>
-          <p:cNvPr id="108" name="TextShape 3"/>
-          <p:cNvSpPr txBox="1"/>
-          <p:nvPr/>
-        </p:nvSpPr>
-        <p:spPr>
-          <a:xfrm>
-            <a:off x="1097280" y="3132720"/>
-            <a:ext cx="7040880" cy="663480"/>
-          </a:xfrm>
-          <a:prstGeom prst="rect">
-            <a:avLst/>
-          </a:prstGeom>
-          <a:noFill/>
-          <a:ln>
-            <a:noFill/>
-          </a:ln>
-        </p:spPr>
-        <p:txBody>
-          <a:bodyPr lIns="90000" tIns="45000" rIns="90000" bIns="45000"/>
-          <a:lstStyle/>
-          <a:p>
-            <a:pPr marL="216000" indent="-216000">
-              <a:buClr>
-                <a:srgbClr val="000000"/>
-              </a:buClr>
-              <a:buSzPct val="45000"/>
-              <a:buFont typeface="Wingdings" charset="2"/>
-              <a:buChar char=""/>
-            </a:pPr>
-            <a:r>
-              <a:rPr lang="en-US" sz="2400" b="0" strike="noStrike" spc="-1">
-                <a:solidFill>
-                  <a:srgbClr val="FFFFFF"/>
-                </a:solidFill>
-                <a:latin typeface="Arial"/>
-              </a:rPr>
-              <a:t>What Benefits does Hybrid Integration Provide?</a:t>
-            </a:r>
+            <a:endParaRPr lang="en-US" sz="2400" dirty="0">
+              <a:solidFill>
+                <a:schemeClr val="bg1"/>
+              </a:solidFill>
+            </a:endParaRPr>
           </a:p>
         </p:txBody>
       </p:sp>
     </p:spTree>
+    <p:extLst>
+      <p:ext uri="{BB962C8B-B14F-4D97-AF65-F5344CB8AC3E}">
+        <p14:creationId xmlns:p14="http://schemas.microsoft.com/office/powerpoint/2010/main" val="774332492"/>
+      </p:ext>
+    </p:extLst>
   </p:cSld>
   <p:clrMapOvr>
     <a:masterClrMapping/>
   </p:clrMapOvr>
-  <p:timing>
-    <p:tnLst>
-      <p:par>
-        <p:cTn id="1" dur="indefinite" restart="never" nodeType="tmRoot">
-          <p:childTnLst>
-            <p:seq>
-              <p:cTn id="2" dur="indefinite" nodeType="mainSeq"/>
-              <p:prevCondLst>
-                <p:cond evt="onPrev" delay="0">
-                  <p:tgtEl>
-                    <p:sldTgt/>
-                  </p:tgtEl>
-                </p:cond>
-              </p:prevCondLst>
-              <p:nextCondLst>
-                <p:cond evt="onNext" delay="0">
-                  <p:tgtEl>
-                    <p:sldTgt/>
-                  </p:tgtEl>
-                </p:cond>
-              </p:nextCondLst>
-            </p:seq>
-          </p:childTnLst>
-        </p:cTn>
-      </p:par>
-    </p:tnLst>
-  </p:timing>
 </p:sld>
 </file>
 
@@ -6339,91 +7050,117 @@
       </p:grpSpPr>
       <p:sp>
         <p:nvSpPr>
-          <p:cNvPr id="109" name="TextShape 1"/>
+          <p:cNvPr id="2" name="Title 1">
+            <a:extLst>
+              <a:ext uri="{FF2B5EF4-FFF2-40B4-BE49-F238E27FC236}">
+                <a16:creationId xmlns:a16="http://schemas.microsoft.com/office/drawing/2014/main" id="{BBB87B1A-5515-4A04-A5AF-3BD4E4E4EC71}"/>
+              </a:ext>
+            </a:extLst>
+          </p:cNvPr>
+          <p:cNvSpPr>
+            <a:spLocks noGrp="1"/>
+          </p:cNvSpPr>
+          <p:nvPr>
+            <p:ph type="title"/>
+          </p:nvPr>
+        </p:nvSpPr>
+        <p:spPr/>
+        <p:txBody>
+          <a:bodyPr/>
+          <a:lstStyle/>
+          <a:p>
+            <a:r>
+              <a:rPr lang="en-US" dirty="0">
+                <a:solidFill>
+                  <a:schemeClr val="bg1"/>
+                </a:solidFill>
+              </a:rPr>
+              <a:t>AZURE SERVICES</a:t>
+            </a:r>
+          </a:p>
+        </p:txBody>
+      </p:sp>
+      <p:sp>
+        <p:nvSpPr>
+          <p:cNvPr id="5" name="TextBox 4">
+            <a:extLst>
+              <a:ext uri="{FF2B5EF4-FFF2-40B4-BE49-F238E27FC236}">
+                <a16:creationId xmlns:a16="http://schemas.microsoft.com/office/drawing/2014/main" id="{038322C4-46CA-4ABD-8051-097BB6D47A71}"/>
+              </a:ext>
+            </a:extLst>
+          </p:cNvPr>
           <p:cNvSpPr txBox="1"/>
           <p:nvPr/>
         </p:nvSpPr>
         <p:spPr>
           <a:xfrm>
-            <a:off x="1097280" y="2011680"/>
-            <a:ext cx="3931920" cy="305280"/>
+            <a:off x="2036748" y="2220053"/>
+            <a:ext cx="8710983" cy="1569660"/>
           </a:xfrm>
           <a:prstGeom prst="rect">
             <a:avLst/>
           </a:prstGeom>
           <a:noFill/>
-          <a:ln>
-            <a:noFill/>
-          </a:ln>
-        </p:spPr>
-      </p:sp>
-      <p:sp>
-        <p:nvSpPr>
-          <p:cNvPr id="110" name="TextShape 2"/>
-          <p:cNvSpPr txBox="1"/>
-          <p:nvPr/>
-        </p:nvSpPr>
-        <p:spPr>
-          <a:xfrm>
-            <a:off x="2834640" y="640080"/>
-            <a:ext cx="7406640" cy="1041480"/>
-          </a:xfrm>
-          <a:prstGeom prst="rect">
-            <a:avLst/>
-          </a:prstGeom>
-          <a:noFill/>
-          <a:ln>
-            <a:noFill/>
-          </a:ln>
-        </p:spPr>
-        <p:txBody>
-          <a:bodyPr lIns="90000" tIns="45000" rIns="90000" bIns="45000"/>
-          <a:lstStyle/>
-          <a:p>
+        </p:spPr>
+        <p:txBody>
+          <a:bodyPr wrap="square" rtlCol="0">
+            <a:spAutoFit/>
+          </a:bodyPr>
+          <a:lstStyle/>
+          <a:p>
+            <a:pPr marL="342900" indent="-342900">
+              <a:buFont typeface="Arial" panose="020B0604020202020204" pitchFamily="34" charset="0"/>
+              <a:buChar char="•"/>
+            </a:pPr>
             <a:r>
-              <a:rPr lang="en-US" sz="4000" b="0" strike="noStrike" spc="-1">
+              <a:rPr lang="en-US" sz="2400" dirty="0">
                 <a:solidFill>
-                  <a:srgbClr val="FFFFFF"/>
+                  <a:schemeClr val="bg1"/>
                 </a:solidFill>
-                <a:latin typeface="Arial"/>
               </a:rPr>
-              <a:t>Infrastructure Integration</a:t>
+              <a:t>SaaS (Software as a Service)</a:t>
             </a:r>
           </a:p>
+          <a:p>
+            <a:endParaRPr lang="en-US" sz="2400" dirty="0">
+              <a:solidFill>
+                <a:schemeClr val="bg1"/>
+              </a:solidFill>
+            </a:endParaRPr>
+          </a:p>
+          <a:p>
+            <a:pPr marL="342900" indent="-342900">
+              <a:buFont typeface="Arial" panose="020B0604020202020204" pitchFamily="34" charset="0"/>
+              <a:buChar char="•"/>
+            </a:pPr>
+            <a:r>
+              <a:rPr lang="en-US" sz="2400" dirty="0">
+                <a:solidFill>
+                  <a:schemeClr val="bg1"/>
+                </a:solidFill>
+              </a:rPr>
+              <a:t>PaaS (Platform as a Service)</a:t>
+            </a:r>
+          </a:p>
+          <a:p>
+            <a:endParaRPr lang="en-US" sz="2400" dirty="0">
+              <a:solidFill>
+                <a:schemeClr val="bg1"/>
+              </a:solidFill>
+            </a:endParaRPr>
+          </a:p>
         </p:txBody>
       </p:sp>
     </p:spTree>
+    <p:extLst>
+      <p:ext uri="{BB962C8B-B14F-4D97-AF65-F5344CB8AC3E}">
+        <p14:creationId xmlns:p14="http://schemas.microsoft.com/office/powerpoint/2010/main" val="507370683"/>
+      </p:ext>
+    </p:extLst>
   </p:cSld>
   <p:clrMapOvr>
     <a:masterClrMapping/>
   </p:clrMapOvr>
-  <p:timing>
-    <p:tnLst>
-      <p:par>
-        <p:cTn id="1" dur="indefinite" restart="never" nodeType="tmRoot">
-          <p:childTnLst>
-            <p:seq>
-              <p:cTn id="2" dur="indefinite" nodeType="mainSeq"/>
-              <p:prevCondLst>
-                <p:cond evt="onPrev" delay="0">
-                  <p:tgtEl>
-                    <p:sldTgt/>
-                  </p:tgtEl>
-                </p:cond>
-              </p:prevCondLst>
-              <p:nextCondLst>
-                <p:cond evt="onNext" delay="0">
-                  <p:tgtEl>
-                    <p:sldTgt/>
-                  </p:tgtEl>
-                </p:cond>
-              </p:nextCondLst>
-            </p:seq>
-          </p:childTnLst>
-        </p:cTn>
-      </p:par>
-    </p:tnLst>
-  </p:timing>
 </p:sld>
 </file>
 
@@ -6446,14 +7183,161 @@
       </p:grpSpPr>
       <p:sp>
         <p:nvSpPr>
-          <p:cNvPr id="111" name="CustomShape 1"/>
-          <p:cNvSpPr/>
+          <p:cNvPr id="2" name="Title 1">
+            <a:extLst>
+              <a:ext uri="{FF2B5EF4-FFF2-40B4-BE49-F238E27FC236}">
+                <a16:creationId xmlns:a16="http://schemas.microsoft.com/office/drawing/2014/main" id="{BBB87B1A-5515-4A04-A5AF-3BD4E4E4EC71}"/>
+              </a:ext>
+            </a:extLst>
+          </p:cNvPr>
+          <p:cNvSpPr>
+            <a:spLocks noGrp="1"/>
+          </p:cNvSpPr>
+          <p:nvPr>
+            <p:ph type="title"/>
+          </p:nvPr>
+        </p:nvSpPr>
+        <p:spPr/>
+        <p:txBody>
+          <a:bodyPr/>
+          <a:lstStyle/>
+          <a:p>
+            <a:r>
+              <a:rPr lang="en-US" dirty="0">
+                <a:solidFill>
+                  <a:schemeClr val="bg1"/>
+                </a:solidFill>
+              </a:rPr>
+              <a:t>AZURE SERVICES</a:t>
+            </a:r>
+          </a:p>
+        </p:txBody>
+      </p:sp>
+      <p:sp>
+        <p:nvSpPr>
+          <p:cNvPr id="5" name="TextBox 4">
+            <a:extLst>
+              <a:ext uri="{FF2B5EF4-FFF2-40B4-BE49-F238E27FC236}">
+                <a16:creationId xmlns:a16="http://schemas.microsoft.com/office/drawing/2014/main" id="{038322C4-46CA-4ABD-8051-097BB6D47A71}"/>
+              </a:ext>
+            </a:extLst>
+          </p:cNvPr>
+          <p:cNvSpPr txBox="1"/>
           <p:nvPr/>
         </p:nvSpPr>
         <p:spPr>
           <a:xfrm>
-            <a:off x="396720" y="3213720"/>
-            <a:ext cx="11683800" cy="579240"/>
+            <a:off x="2036748" y="2220053"/>
+            <a:ext cx="8710983" cy="1938992"/>
+          </a:xfrm>
+          <a:prstGeom prst="rect">
+            <a:avLst/>
+          </a:prstGeom>
+          <a:noFill/>
+        </p:spPr>
+        <p:txBody>
+          <a:bodyPr wrap="square" rtlCol="0">
+            <a:spAutoFit/>
+          </a:bodyPr>
+          <a:lstStyle/>
+          <a:p>
+            <a:pPr marL="342900" indent="-342900">
+              <a:buFont typeface="Arial" panose="020B0604020202020204" pitchFamily="34" charset="0"/>
+              <a:buChar char="•"/>
+            </a:pPr>
+            <a:r>
+              <a:rPr lang="en-US" sz="2400" dirty="0">
+                <a:solidFill>
+                  <a:schemeClr val="bg1"/>
+                </a:solidFill>
+              </a:rPr>
+              <a:t>SaaS (Software as a Service)</a:t>
+            </a:r>
+          </a:p>
+          <a:p>
+            <a:endParaRPr lang="en-US" sz="2400" dirty="0">
+              <a:solidFill>
+                <a:schemeClr val="bg1"/>
+              </a:solidFill>
+            </a:endParaRPr>
+          </a:p>
+          <a:p>
+            <a:pPr marL="342900" indent="-342900">
+              <a:buFont typeface="Arial" panose="020B0604020202020204" pitchFamily="34" charset="0"/>
+              <a:buChar char="•"/>
+            </a:pPr>
+            <a:r>
+              <a:rPr lang="en-US" sz="2400" dirty="0">
+                <a:solidFill>
+                  <a:schemeClr val="bg1"/>
+                </a:solidFill>
+              </a:rPr>
+              <a:t>PaaS (Platform as a Service)</a:t>
+            </a:r>
+          </a:p>
+          <a:p>
+            <a:endParaRPr lang="en-US" sz="2400" dirty="0">
+              <a:solidFill>
+                <a:schemeClr val="bg1"/>
+              </a:solidFill>
+            </a:endParaRPr>
+          </a:p>
+          <a:p>
+            <a:pPr marL="342900" indent="-342900">
+              <a:buFont typeface="Arial" panose="020B0604020202020204" pitchFamily="34" charset="0"/>
+              <a:buChar char="•"/>
+            </a:pPr>
+            <a:r>
+              <a:rPr lang="en-US" sz="2400" dirty="0">
+                <a:solidFill>
+                  <a:schemeClr val="bg1"/>
+                </a:solidFill>
+              </a:rPr>
+              <a:t>IaaS (Infrastructure as a Service)</a:t>
+            </a:r>
+          </a:p>
+        </p:txBody>
+      </p:sp>
+    </p:spTree>
+    <p:extLst>
+      <p:ext uri="{BB962C8B-B14F-4D97-AF65-F5344CB8AC3E}">
+        <p14:creationId xmlns:p14="http://schemas.microsoft.com/office/powerpoint/2010/main" val="3668756339"/>
+      </p:ext>
+    </p:extLst>
+  </p:cSld>
+  <p:clrMapOvr>
+    <a:masterClrMapping/>
+  </p:clrMapOvr>
+</p:sld>
+</file>
+
+<file path=ppt/slides/slide9.xml><?xml version="1.0" encoding="utf-8"?>
+<p:sld xmlns:a="http://schemas.openxmlformats.org/drawingml/2006/main" xmlns:r="http://schemas.openxmlformats.org/officeDocument/2006/relationships" xmlns:p="http://schemas.openxmlformats.org/presentationml/2006/main">
+  <p:cSld>
+    <p:spTree>
+      <p:nvGrpSpPr>
+        <p:cNvPr id="1" name=""/>
+        <p:cNvGrpSpPr/>
+        <p:nvPr/>
+      </p:nvGrpSpPr>
+      <p:grpSpPr>
+        <a:xfrm>
+          <a:off x="0" y="0"/>
+          <a:ext cx="0" cy="0"/>
+          <a:chOff x="0" y="0"/>
+          <a:chExt cx="0" cy="0"/>
+        </a:xfrm>
+      </p:grpSpPr>
+      <p:sp>
+        <p:nvSpPr>
+          <p:cNvPr id="109" name="TextShape 1"/>
+          <p:cNvSpPr txBox="1"/>
+          <p:nvPr/>
+        </p:nvSpPr>
+        <p:spPr>
+          <a:xfrm>
+            <a:off x="1097280" y="2011680"/>
+            <a:ext cx="3931920" cy="305280"/>
           </a:xfrm>
           <a:prstGeom prst="rect">
             <a:avLst/>
@@ -6463,41 +7347,88 @@
             <a:noFill/>
           </a:ln>
         </p:spPr>
-        <p:style>
-          <a:lnRef idx="0">
-            <a:scrgbClr r="0" g="0" b="0"/>
-          </a:lnRef>
-          <a:fillRef idx="0">
-            <a:scrgbClr r="0" g="0" b="0"/>
-          </a:fillRef>
-          <a:effectRef idx="0">
-            <a:scrgbClr r="0" g="0" b="0"/>
-          </a:effectRef>
-          <a:fontRef idx="minor"/>
-        </p:style>
-        <p:txBody>
-          <a:bodyPr/>
-          <a:lstStyle/>
-          <a:p>
-            <a:pPr algn="ctr">
-              <a:lnSpc>
-                <a:spcPct val="100000"/>
-              </a:lnSpc>
+      </p:sp>
+      <p:sp>
+        <p:nvSpPr>
+          <p:cNvPr id="110" name="TextShape 2"/>
+          <p:cNvSpPr txBox="1"/>
+          <p:nvPr/>
+        </p:nvSpPr>
+        <p:spPr>
+          <a:xfrm>
+            <a:off x="1097280" y="401992"/>
+            <a:ext cx="7406640" cy="1041480"/>
+          </a:xfrm>
+          <a:prstGeom prst="rect">
+            <a:avLst/>
+          </a:prstGeom>
+          <a:noFill/>
+          <a:ln>
+            <a:noFill/>
+          </a:ln>
+        </p:spPr>
+        <p:txBody>
+          <a:bodyPr lIns="90000" tIns="45000" rIns="90000" bIns="45000"/>
+          <a:lstStyle/>
+          <a:p>
+            <a:r>
+              <a:rPr lang="en-US" sz="4000" spc="-1" dirty="0">
+                <a:solidFill>
+                  <a:srgbClr val="FFFFFF"/>
+                </a:solidFill>
+                <a:latin typeface="Arial"/>
+              </a:rPr>
+              <a:t>Storage Migration Features</a:t>
+            </a:r>
+            <a:endParaRPr lang="en-US" sz="4000" b="0" strike="noStrike" spc="-1" dirty="0">
+              <a:solidFill>
+                <a:srgbClr val="FFFFFF"/>
+              </a:solidFill>
+              <a:latin typeface="Arial"/>
+            </a:endParaRPr>
+          </a:p>
+        </p:txBody>
+      </p:sp>
+      <p:sp>
+        <p:nvSpPr>
+          <p:cNvPr id="2" name="TextBox 1">
+            <a:extLst>
+              <a:ext uri="{FF2B5EF4-FFF2-40B4-BE49-F238E27FC236}">
+                <a16:creationId xmlns:a16="http://schemas.microsoft.com/office/drawing/2014/main" id="{0671EFFB-B819-4FE0-AA2E-2201D3CA6913}"/>
+              </a:ext>
+            </a:extLst>
+          </p:cNvPr>
+          <p:cNvSpPr txBox="1"/>
+          <p:nvPr/>
+        </p:nvSpPr>
+        <p:spPr>
+          <a:xfrm>
+            <a:off x="2093843" y="2411896"/>
+            <a:ext cx="7673009" cy="461665"/>
+          </a:xfrm>
+          <a:prstGeom prst="rect">
+            <a:avLst/>
+          </a:prstGeom>
+          <a:noFill/>
+        </p:spPr>
+        <p:txBody>
+          <a:bodyPr wrap="square" rtlCol="0">
+            <a:spAutoFit/>
+          </a:bodyPr>
+          <a:lstStyle/>
+          <a:p>
+            <a:pPr marL="285750" indent="-285750">
+              <a:buFont typeface="Arial" panose="020B0604020202020204" pitchFamily="34" charset="0"/>
+              <a:buChar char="•"/>
             </a:pPr>
             <a:r>
-              <a:rPr lang="en-US" sz="3200" b="1" u="sng" strike="noStrike" spc="-1">
+              <a:rPr lang="en-US" sz="2400" dirty="0">
                 <a:solidFill>
-                  <a:srgbClr val="266662"/>
+                  <a:schemeClr val="bg1"/>
                 </a:solidFill>
-                <a:uFillTx/>
-                <a:latin typeface="Century Gothic"/>
-                <a:hlinkClick r:id="rId2"/>
               </a:rPr>
-              <a:t>https://www.youtube.com/watch?v=3wvTYbnXyB4</a:t>
+              <a:t>Transfer of Data from legacy systems to WS2019</a:t>
             </a:r>
-            <a:endParaRPr lang="en-US" sz="3200" b="0" strike="noStrike" spc="-1">
-              <a:latin typeface="Arial"/>
-            </a:endParaRPr>
           </a:p>
         </p:txBody>
       </p:sp>
@@ -6984,4 +7915,299 @@
   <a:objectDefaults/>
   <a:extraClrSchemeLst/>
 </a:theme>
+</file>
+
+<file path=ppt/theme/theme3.xml><?xml version="1.0" encoding="utf-8"?>
+<a:theme xmlns:a="http://schemas.openxmlformats.org/drawingml/2006/main" name="Office Theme">
+  <a:themeElements>
+    <a:clrScheme name="Office">
+      <a:dk1>
+        <a:sysClr val="windowText" lastClr="000000"/>
+      </a:dk1>
+      <a:lt1>
+        <a:sysClr val="window" lastClr="FFFFFF"/>
+      </a:lt1>
+      <a:dk2>
+        <a:srgbClr val="44546A"/>
+      </a:dk2>
+      <a:lt2>
+        <a:srgbClr val="E7E6E6"/>
+      </a:lt2>
+      <a:accent1>
+        <a:srgbClr val="4472C4"/>
+      </a:accent1>
+      <a:accent2>
+        <a:srgbClr val="ED7D31"/>
+      </a:accent2>
+      <a:accent3>
+        <a:srgbClr val="A5A5A5"/>
+      </a:accent3>
+      <a:accent4>
+        <a:srgbClr val="FFC000"/>
+      </a:accent4>
+      <a:accent5>
+        <a:srgbClr val="5B9BD5"/>
+      </a:accent5>
+      <a:accent6>
+        <a:srgbClr val="70AD47"/>
+      </a:accent6>
+      <a:hlink>
+        <a:srgbClr val="0563C1"/>
+      </a:hlink>
+      <a:folHlink>
+        <a:srgbClr val="954F72"/>
+      </a:folHlink>
+    </a:clrScheme>
+    <a:fontScheme name="Office">
+      <a:majorFont>
+        <a:latin typeface="Calibri Light" panose="020F0302020204030204"/>
+        <a:ea typeface=""/>
+        <a:cs typeface=""/>
+        <a:font script="Jpan" typeface="游ゴシック Light"/>
+        <a:font script="Hang" typeface="맑은 고딕"/>
+        <a:font script="Hans" typeface="等线 Light"/>
+        <a:font script="Hant" typeface="新細明體"/>
+        <a:font script="Arab" typeface="Times New Roman"/>
+        <a:font script="Hebr" typeface="Times New Roman"/>
+        <a:font script="Thai" typeface="Angsana New"/>
+        <a:font script="Ethi" typeface="Nyala"/>
+        <a:font script="Beng" typeface="Vrinda"/>
+        <a:font script="Gujr" typeface="Shruti"/>
+        <a:font script="Khmr" typeface="MoolBoran"/>
+        <a:font script="Knda" typeface="Tunga"/>
+        <a:font script="Guru" typeface="Raavi"/>
+        <a:font script="Cans" typeface="Euphemia"/>
+        <a:font script="Cher" typeface="Plantagenet Cherokee"/>
+        <a:font script="Yiii" typeface="Microsoft Yi Baiti"/>
+        <a:font script="Tibt" typeface="Microsoft Himalaya"/>
+        <a:font script="Thaa" typeface="MV Boli"/>
+        <a:font script="Deva" typeface="Mangal"/>
+        <a:font script="Telu" typeface="Gautami"/>
+        <a:font script="Taml" typeface="Latha"/>
+        <a:font script="Syrc" typeface="Estrangelo Edessa"/>
+        <a:font script="Orya" typeface="Kalinga"/>
+        <a:font script="Mlym" typeface="Kartika"/>
+        <a:font script="Laoo" typeface="DokChampa"/>
+        <a:font script="Sinh" typeface="Iskoola Pota"/>
+        <a:font script="Mong" typeface="Mongolian Baiti"/>
+        <a:font script="Viet" typeface="Times New Roman"/>
+        <a:font script="Uigh" typeface="Microsoft Uighur"/>
+        <a:font script="Geor" typeface="Sylfaen"/>
+        <a:font script="Armn" typeface="Arial"/>
+        <a:font script="Bugi" typeface="Leelawadee UI"/>
+        <a:font script="Bopo" typeface="Microsoft JhengHei"/>
+        <a:font script="Java" typeface="Javanese Text"/>
+        <a:font script="Lisu" typeface="Segoe UI"/>
+        <a:font script="Mymr" typeface="Myanmar Text"/>
+        <a:font script="Nkoo" typeface="Ebrima"/>
+        <a:font script="Olck" typeface="Nirmala UI"/>
+        <a:font script="Osma" typeface="Ebrima"/>
+        <a:font script="Phag" typeface="Phagspa"/>
+        <a:font script="Syrn" typeface="Estrangelo Edessa"/>
+        <a:font script="Syrj" typeface="Estrangelo Edessa"/>
+        <a:font script="Syre" typeface="Estrangelo Edessa"/>
+        <a:font script="Sora" typeface="Nirmala UI"/>
+        <a:font script="Tale" typeface="Microsoft Tai Le"/>
+        <a:font script="Talu" typeface="Microsoft New Tai Lue"/>
+        <a:font script="Tfng" typeface="Ebrima"/>
+      </a:majorFont>
+      <a:minorFont>
+        <a:latin typeface="Calibri" panose="020F0502020204030204"/>
+        <a:ea typeface=""/>
+        <a:cs typeface=""/>
+        <a:font script="Jpan" typeface="游ゴシック"/>
+        <a:font script="Hang" typeface="맑은 고딕"/>
+        <a:font script="Hans" typeface="等线"/>
+        <a:font script="Hant" typeface="新細明體"/>
+        <a:font script="Arab" typeface="Arial"/>
+        <a:font script="Hebr" typeface="Arial"/>
+        <a:font script="Thai" typeface="Cordia New"/>
+        <a:font script="Ethi" typeface="Nyala"/>
+        <a:font script="Beng" typeface="Vrinda"/>
+        <a:font script="Gujr" typeface="Shruti"/>
+        <a:font script="Khmr" typeface="DaunPenh"/>
+        <a:font script="Knda" typeface="Tunga"/>
+        <a:font script="Guru" typeface="Raavi"/>
+        <a:font script="Cans" typeface="Euphemia"/>
+        <a:font script="Cher" typeface="Plantagenet Cherokee"/>
+        <a:font script="Yiii" typeface="Microsoft Yi Baiti"/>
+        <a:font script="Tibt" typeface="Microsoft Himalaya"/>
+        <a:font script="Thaa" typeface="MV Boli"/>
+        <a:font script="Deva" typeface="Mangal"/>
+        <a:font script="Telu" typeface="Gautami"/>
+        <a:font script="Taml" typeface="Latha"/>
+        <a:font script="Syrc" typeface="Estrangelo Edessa"/>
+        <a:font script="Orya" typeface="Kalinga"/>
+        <a:font script="Mlym" typeface="Kartika"/>
+        <a:font script="Laoo" typeface="DokChampa"/>
+        <a:font script="Sinh" typeface="Iskoola Pota"/>
+        <a:font script="Mong" typeface="Mongolian Baiti"/>
+        <a:font script="Viet" typeface="Arial"/>
+        <a:font script="Uigh" typeface="Microsoft Uighur"/>
+        <a:font script="Geor" typeface="Sylfaen"/>
+        <a:font script="Armn" typeface="Arial"/>
+        <a:font script="Bugi" typeface="Leelawadee UI"/>
+        <a:font script="Bopo" typeface="Microsoft JhengHei"/>
+        <a:font script="Java" typeface="Javanese Text"/>
+        <a:font script="Lisu" typeface="Segoe UI"/>
+        <a:font script="Mymr" typeface="Myanmar Text"/>
+        <a:font script="Nkoo" typeface="Ebrima"/>
+        <a:font script="Olck" typeface="Nirmala UI"/>
+        <a:font script="Osma" typeface="Ebrima"/>
+        <a:font script="Phag" typeface="Phagspa"/>
+        <a:font script="Syrn" typeface="Estrangelo Edessa"/>
+        <a:font script="Syrj" typeface="Estrangelo Edessa"/>
+        <a:font script="Syre" typeface="Estrangelo Edessa"/>
+        <a:font script="Sora" typeface="Nirmala UI"/>
+        <a:font script="Tale" typeface="Microsoft Tai Le"/>
+        <a:font script="Talu" typeface="Microsoft New Tai Lue"/>
+        <a:font script="Tfng" typeface="Ebrima"/>
+      </a:minorFont>
+    </a:fontScheme>
+    <a:fmtScheme name="Office">
+      <a:fillStyleLst>
+        <a:solidFill>
+          <a:schemeClr val="phClr"/>
+        </a:solidFill>
+        <a:gradFill rotWithShape="1">
+          <a:gsLst>
+            <a:gs pos="0">
+              <a:schemeClr val="phClr">
+                <a:lumMod val="110000"/>
+                <a:satMod val="105000"/>
+                <a:tint val="67000"/>
+              </a:schemeClr>
+            </a:gs>
+            <a:gs pos="50000">
+              <a:schemeClr val="phClr">
+                <a:lumMod val="105000"/>
+                <a:satMod val="103000"/>
+                <a:tint val="73000"/>
+              </a:schemeClr>
+            </a:gs>
+            <a:gs pos="100000">
+              <a:schemeClr val="phClr">
+                <a:lumMod val="105000"/>
+                <a:satMod val="109000"/>
+                <a:tint val="81000"/>
+              </a:schemeClr>
+            </a:gs>
+          </a:gsLst>
+          <a:lin ang="5400000" scaled="0"/>
+        </a:gradFill>
+        <a:gradFill rotWithShape="1">
+          <a:gsLst>
+            <a:gs pos="0">
+              <a:schemeClr val="phClr">
+                <a:satMod val="103000"/>
+                <a:lumMod val="102000"/>
+                <a:tint val="94000"/>
+              </a:schemeClr>
+            </a:gs>
+            <a:gs pos="50000">
+              <a:schemeClr val="phClr">
+                <a:satMod val="110000"/>
+                <a:lumMod val="100000"/>
+                <a:shade val="100000"/>
+              </a:schemeClr>
+            </a:gs>
+            <a:gs pos="100000">
+              <a:schemeClr val="phClr">
+                <a:lumMod val="99000"/>
+                <a:satMod val="120000"/>
+                <a:shade val="78000"/>
+              </a:schemeClr>
+            </a:gs>
+          </a:gsLst>
+          <a:lin ang="5400000" scaled="0"/>
+        </a:gradFill>
+      </a:fillStyleLst>
+      <a:lnStyleLst>
+        <a:ln w="6350" cap="flat" cmpd="sng" algn="ctr">
+          <a:solidFill>
+            <a:schemeClr val="phClr"/>
+          </a:solidFill>
+          <a:prstDash val="solid"/>
+          <a:miter lim="800000"/>
+        </a:ln>
+        <a:ln w="12700" cap="flat" cmpd="sng" algn="ctr">
+          <a:solidFill>
+            <a:schemeClr val="phClr"/>
+          </a:solidFill>
+          <a:prstDash val="solid"/>
+          <a:miter lim="800000"/>
+        </a:ln>
+        <a:ln w="19050" cap="flat" cmpd="sng" algn="ctr">
+          <a:solidFill>
+            <a:schemeClr val="phClr"/>
+          </a:solidFill>
+          <a:prstDash val="solid"/>
+          <a:miter lim="800000"/>
+        </a:ln>
+      </a:lnStyleLst>
+      <a:effectStyleLst>
+        <a:effectStyle>
+          <a:effectLst/>
+        </a:effectStyle>
+        <a:effectStyle>
+          <a:effectLst/>
+        </a:effectStyle>
+        <a:effectStyle>
+          <a:effectLst>
+            <a:outerShdw blurRad="57150" dist="19050" dir="5400000" algn="ctr" rotWithShape="0">
+              <a:srgbClr val="000000">
+                <a:alpha val="63000"/>
+              </a:srgbClr>
+            </a:outerShdw>
+          </a:effectLst>
+        </a:effectStyle>
+      </a:effectStyleLst>
+      <a:bgFillStyleLst>
+        <a:solidFill>
+          <a:schemeClr val="phClr"/>
+        </a:solidFill>
+        <a:solidFill>
+          <a:schemeClr val="phClr">
+            <a:tint val="95000"/>
+            <a:satMod val="170000"/>
+          </a:schemeClr>
+        </a:solidFill>
+        <a:gradFill rotWithShape="1">
+          <a:gsLst>
+            <a:gs pos="0">
+              <a:schemeClr val="phClr">
+                <a:tint val="93000"/>
+                <a:satMod val="150000"/>
+                <a:shade val="98000"/>
+                <a:lumMod val="102000"/>
+              </a:schemeClr>
+            </a:gs>
+            <a:gs pos="50000">
+              <a:schemeClr val="phClr">
+                <a:tint val="98000"/>
+                <a:satMod val="130000"/>
+                <a:shade val="90000"/>
+                <a:lumMod val="103000"/>
+              </a:schemeClr>
+            </a:gs>
+            <a:gs pos="100000">
+              <a:schemeClr val="phClr">
+                <a:shade val="63000"/>
+                <a:satMod val="120000"/>
+              </a:schemeClr>
+            </a:gs>
+          </a:gsLst>
+          <a:lin ang="5400000" scaled="0"/>
+        </a:gradFill>
+      </a:bgFillStyleLst>
+    </a:fmtScheme>
+  </a:themeElements>
+  <a:objectDefaults/>
+  <a:extraClrSchemeLst/>
+  <a:extLst>
+    <a:ext uri="{05A4C25C-085E-4340-85A3-A5531E510DB2}">
+      <thm15:themeFamily xmlns:thm15="http://schemas.microsoft.com/office/thememl/2012/main" name="Office Theme" id="{62F939B6-93AF-4DB8-9C6B-D6C7DFDC589F}" vid="{4A3C46E8-61CC-4603-A589-7422A47A8E4A}"/>
+    </a:ext>
+  </a:extLst>
+</a:theme>
 </file>
</xml_diff>

<commit_message>
added a few notes
</commit_message>
<xml_diff>
--- a/Windows Server 2019.pptx
+++ b/Windows Server 2019.pptx
@@ -237,7 +237,7 @@
           <a:p>
             <a:fld id="{00BD23E7-6540-4C2C-A839-D8B7C873A27C}" type="datetimeFigureOut">
               <a:rPr lang="en-US" smtClean="0"/>
-              <a:t>12/1/2018</a:t>
+              <a:t>12/4/2018</a:t>
             </a:fld>
             <a:endParaRPr lang="en-US"/>
           </a:p>
@@ -504,6 +504,180 @@
 </p:notesMaster>
 </file>
 
+<file path=ppt/notesSlides/notesSlide1.xml><?xml version="1.0" encoding="utf-8"?>
+<p:notes xmlns:a="http://schemas.openxmlformats.org/drawingml/2006/main" xmlns:r="http://schemas.openxmlformats.org/officeDocument/2006/relationships" xmlns:p="http://schemas.openxmlformats.org/presentationml/2006/main">
+  <p:cSld>
+    <p:spTree>
+      <p:nvGrpSpPr>
+        <p:cNvPr id="1" name=""/>
+        <p:cNvGrpSpPr/>
+        <p:nvPr/>
+      </p:nvGrpSpPr>
+      <p:grpSpPr>
+        <a:xfrm>
+          <a:off x="0" y="0"/>
+          <a:ext cx="0" cy="0"/>
+          <a:chOff x="0" y="0"/>
+          <a:chExt cx="0" cy="0"/>
+        </a:xfrm>
+      </p:grpSpPr>
+      <p:sp>
+        <p:nvSpPr>
+          <p:cNvPr id="2" name="Slide Image Placeholder 1"/>
+          <p:cNvSpPr>
+            <a:spLocks noGrp="1" noRot="1" noChangeAspect="1"/>
+          </p:cNvSpPr>
+          <p:nvPr>
+            <p:ph type="sldImg"/>
+          </p:nvPr>
+        </p:nvSpPr>
+        <p:spPr/>
+      </p:sp>
+      <p:sp>
+        <p:nvSpPr>
+          <p:cNvPr id="3" name="Notes Placeholder 2"/>
+          <p:cNvSpPr>
+            <a:spLocks noGrp="1"/>
+          </p:cNvSpPr>
+          <p:nvPr>
+            <p:ph type="body" idx="1"/>
+          </p:nvPr>
+        </p:nvSpPr>
+        <p:spPr/>
+        <p:txBody>
+          <a:bodyPr/>
+          <a:lstStyle/>
+          <a:p>
+            <a:r>
+              <a:rPr lang="en-US" dirty="0"/>
+              <a:t>Transfers from windows server 2008, 2012,2016 legacy systems</a:t>
+            </a:r>
+          </a:p>
+        </p:txBody>
+      </p:sp>
+      <p:sp>
+        <p:nvSpPr>
+          <p:cNvPr id="4" name="Slide Number Placeholder 3"/>
+          <p:cNvSpPr>
+            <a:spLocks noGrp="1"/>
+          </p:cNvSpPr>
+          <p:nvPr>
+            <p:ph type="sldNum" sz="quarter" idx="5"/>
+          </p:nvPr>
+        </p:nvSpPr>
+        <p:spPr/>
+        <p:txBody>
+          <a:bodyPr/>
+          <a:lstStyle/>
+          <a:p>
+            <a:fld id="{AFA52EE8-9F58-4071-B24F-CAEAFF77E153}" type="slidenum">
+              <a:rPr lang="en-US" smtClean="0"/>
+              <a:t>10</a:t>
+            </a:fld>
+            <a:endParaRPr lang="en-US"/>
+          </a:p>
+        </p:txBody>
+      </p:sp>
+    </p:spTree>
+    <p:extLst>
+      <p:ext uri="{BB962C8B-B14F-4D97-AF65-F5344CB8AC3E}">
+        <p14:creationId xmlns:p14="http://schemas.microsoft.com/office/powerpoint/2010/main" val="708205389"/>
+      </p:ext>
+    </p:extLst>
+  </p:cSld>
+  <p:clrMapOvr>
+    <a:masterClrMapping/>
+  </p:clrMapOvr>
+</p:notes>
+</file>
+
+<file path=ppt/notesSlides/notesSlide2.xml><?xml version="1.0" encoding="utf-8"?>
+<p:notes xmlns:a="http://schemas.openxmlformats.org/drawingml/2006/main" xmlns:r="http://schemas.openxmlformats.org/officeDocument/2006/relationships" xmlns:p="http://schemas.openxmlformats.org/presentationml/2006/main">
+  <p:cSld>
+    <p:spTree>
+      <p:nvGrpSpPr>
+        <p:cNvPr id="1" name=""/>
+        <p:cNvGrpSpPr/>
+        <p:nvPr/>
+      </p:nvGrpSpPr>
+      <p:grpSpPr>
+        <a:xfrm>
+          <a:off x="0" y="0"/>
+          <a:ext cx="0" cy="0"/>
+          <a:chOff x="0" y="0"/>
+          <a:chExt cx="0" cy="0"/>
+        </a:xfrm>
+      </p:grpSpPr>
+      <p:sp>
+        <p:nvSpPr>
+          <p:cNvPr id="2" name="Slide Image Placeholder 1"/>
+          <p:cNvSpPr>
+            <a:spLocks noGrp="1" noRot="1" noChangeAspect="1"/>
+          </p:cNvSpPr>
+          <p:nvPr>
+            <p:ph type="sldImg"/>
+          </p:nvPr>
+        </p:nvSpPr>
+        <p:spPr/>
+      </p:sp>
+      <p:sp>
+        <p:nvSpPr>
+          <p:cNvPr id="3" name="Notes Placeholder 2"/>
+          <p:cNvSpPr>
+            <a:spLocks noGrp="1"/>
+          </p:cNvSpPr>
+          <p:nvPr>
+            <p:ph type="body" idx="1"/>
+          </p:nvPr>
+        </p:nvSpPr>
+        <p:spPr/>
+        <p:txBody>
+          <a:bodyPr/>
+          <a:lstStyle/>
+          <a:p>
+            <a:r>
+              <a:rPr lang="en-US" dirty="0"/>
+              <a:t>4 quadrillion, 64 trillion</a:t>
+            </a:r>
+          </a:p>
+        </p:txBody>
+      </p:sp>
+      <p:sp>
+        <p:nvSpPr>
+          <p:cNvPr id="4" name="Slide Number Placeholder 3"/>
+          <p:cNvSpPr>
+            <a:spLocks noGrp="1"/>
+          </p:cNvSpPr>
+          <p:nvPr>
+            <p:ph type="sldNum" sz="quarter" idx="5"/>
+          </p:nvPr>
+        </p:nvSpPr>
+        <p:spPr/>
+        <p:txBody>
+          <a:bodyPr/>
+          <a:lstStyle/>
+          <a:p>
+            <a:fld id="{AFA52EE8-9F58-4071-B24F-CAEAFF77E153}" type="slidenum">
+              <a:rPr lang="en-US" smtClean="0"/>
+              <a:t>15</a:t>
+            </a:fld>
+            <a:endParaRPr lang="en-US"/>
+          </a:p>
+        </p:txBody>
+      </p:sp>
+    </p:spTree>
+    <p:extLst>
+      <p:ext uri="{BB962C8B-B14F-4D97-AF65-F5344CB8AC3E}">
+        <p14:creationId xmlns:p14="http://schemas.microsoft.com/office/powerpoint/2010/main" val="792755176"/>
+      </p:ext>
+    </p:extLst>
+  </p:cSld>
+  <p:clrMapOvr>
+    <a:masterClrMapping/>
+  </p:clrMapOvr>
+</p:notes>
+</file>
+
 <file path=ppt/slideLayouts/slideLayout1.xml><?xml version="1.0" encoding="utf-8"?>
 <p:sldLayout xmlns:a="http://schemas.openxmlformats.org/drawingml/2006/main" xmlns:r="http://schemas.openxmlformats.org/officeDocument/2006/relationships" xmlns:p="http://schemas.openxmlformats.org/presentationml/2006/main" type="blank" preserve="1">
   <p:cSld name="Blank Slide">
@@ -3806,7 +3980,7 @@
                 </a:solidFill>
                 <a:latin typeface="Century Gothic"/>
               </a:rPr>
-              <a:t>12/1/2018</a:t>
+              <a:t>12/4/2018</a:t>
             </a:fld>
             <a:endParaRPr lang="en-US" sz="1100" b="0" strike="noStrike" spc="-1">
               <a:latin typeface="Times New Roman"/>
@@ -4630,7 +4804,7 @@
                 </a:solidFill>
                 <a:latin typeface="Century Gothic"/>
               </a:rPr>
-              <a:t>12/1/2018</a:t>
+              <a:t>12/4/2018</a:t>
             </a:fld>
             <a:endParaRPr lang="en-US" sz="1100" b="0" strike="noStrike" spc="-1">
               <a:latin typeface="Times New Roman"/>
@@ -5583,13 +5757,13 @@
   <p:clrMapOvr>
     <a:masterClrMapping/>
   </p:clrMapOvr>
-  <mc:AlternateContent xmlns:mc="http://schemas.openxmlformats.org/markup-compatibility/2006">
-    <mc:Choice xmlns:p15="http://schemas.microsoft.com/office/powerpoint/2012/main" Requires="p15">
+  <mc:AlternateContent xmlns:mc="http://schemas.openxmlformats.org/markup-compatibility/2006" xmlns:p15="http://schemas.microsoft.com/office/powerpoint/2012/main">
+    <mc:Choice Requires="p15">
       <p:transition xmlns:p14="http://schemas.microsoft.com/office/powerpoint/2010/main" spd="slow" p14:dur="2000">
         <p15:prstTrans prst="fracture"/>
       </p:transition>
     </mc:Choice>
-    <mc:Fallback>
+    <mc:Fallback xmlns="">
       <p:transition spd="slow">
         <p:fade/>
       </p:transition>
@@ -5968,13 +6142,13 @@
   <p:clrMapOvr>
     <a:masterClrMapping/>
   </p:clrMapOvr>
-  <mc:AlternateContent xmlns:mc="http://schemas.openxmlformats.org/markup-compatibility/2006">
-    <mc:Choice xmlns:p15="http://schemas.microsoft.com/office/powerpoint/2012/main" Requires="p15">
+  <mc:AlternateContent xmlns:mc="http://schemas.openxmlformats.org/markup-compatibility/2006" xmlns:p15="http://schemas.microsoft.com/office/powerpoint/2012/main">
+    <mc:Choice Requires="p15">
       <p:transition xmlns:p14="http://schemas.microsoft.com/office/powerpoint/2010/main" spd="slow" p14:dur="2000">
         <p15:prstTrans prst="fracture"/>
       </p:transition>
     </mc:Choice>
-    <mc:Fallback>
+    <mc:Fallback xmlns="">
       <p:transition spd="slow">
         <p:fade/>
       </p:transition>
@@ -6270,13 +6444,13 @@
   <p:clrMapOvr>
     <a:masterClrMapping/>
   </p:clrMapOvr>
-  <mc:AlternateContent xmlns:mc="http://schemas.openxmlformats.org/markup-compatibility/2006">
-    <mc:Choice xmlns:p159="http://schemas.microsoft.com/office/powerpoint/2015/09/main" Requires="p159">
+  <mc:AlternateContent xmlns:mc="http://schemas.openxmlformats.org/markup-compatibility/2006" xmlns:p159="http://schemas.microsoft.com/office/powerpoint/2015/09/main">
+    <mc:Choice Requires="p159">
       <p:transition xmlns:p14="http://schemas.microsoft.com/office/powerpoint/2010/main" spd="slow" p14:dur="2000">
         <p159:morph option="byObject"/>
       </p:transition>
     </mc:Choice>
-    <mc:Fallback>
+    <mc:Fallback xmlns="">
       <p:transition spd="slow">
         <p:fade/>
       </p:transition>
@@ -6457,13 +6631,13 @@
   <p:clrMapOvr>
     <a:masterClrMapping/>
   </p:clrMapOvr>
-  <mc:AlternateContent xmlns:mc="http://schemas.openxmlformats.org/markup-compatibility/2006">
-    <mc:Choice xmlns:p15="http://schemas.microsoft.com/office/powerpoint/2012/main" Requires="p15">
+  <mc:AlternateContent xmlns:mc="http://schemas.openxmlformats.org/markup-compatibility/2006" xmlns:p15="http://schemas.microsoft.com/office/powerpoint/2012/main">
+    <mc:Choice Requires="p15">
       <p:transition xmlns:p14="http://schemas.microsoft.com/office/powerpoint/2010/main" spd="slow" p14:dur="2000">
         <p15:prstTrans prst="fracture"/>
       </p:transition>
     </mc:Choice>
-    <mc:Fallback>
+    <mc:Fallback xmlns="">
       <p:transition spd="slow">
         <p:fade/>
       </p:transition>
@@ -6658,13 +6832,13 @@
   <p:clrMapOvr>
     <a:masterClrMapping/>
   </p:clrMapOvr>
-  <mc:AlternateContent xmlns:mc="http://schemas.openxmlformats.org/markup-compatibility/2006">
-    <mc:Choice xmlns:p159="http://schemas.microsoft.com/office/powerpoint/2015/09/main" Requires="p159">
+  <mc:AlternateContent xmlns:mc="http://schemas.openxmlformats.org/markup-compatibility/2006" xmlns:p159="http://schemas.microsoft.com/office/powerpoint/2015/09/main">
+    <mc:Choice Requires="p159">
       <p:transition xmlns:p14="http://schemas.microsoft.com/office/powerpoint/2010/main" spd="slow" p14:dur="2000">
         <p159:morph option="byObject"/>
       </p:transition>
     </mc:Choice>
-    <mc:Fallback>
+    <mc:Fallback xmlns="">
       <p:transition spd="slow">
         <p:fade/>
       </p:transition>
@@ -7618,13 +7792,13 @@
   <p:clrMapOvr>
     <a:masterClrMapping/>
   </p:clrMapOvr>
-  <mc:AlternateContent xmlns:mc="http://schemas.openxmlformats.org/markup-compatibility/2006">
-    <mc:Choice xmlns:p15="http://schemas.microsoft.com/office/powerpoint/2012/main" Requires="p15">
+  <mc:AlternateContent xmlns:mc="http://schemas.openxmlformats.org/markup-compatibility/2006" xmlns:p15="http://schemas.microsoft.com/office/powerpoint/2012/main">
+    <mc:Choice Requires="p15">
       <p:transition xmlns:p14="http://schemas.microsoft.com/office/powerpoint/2010/main" spd="slow" p14:dur="2000">
         <p15:prstTrans prst="fracture"/>
       </p:transition>
     </mc:Choice>
-    <mc:Fallback>
+    <mc:Fallback xmlns="">
       <p:transition spd="slow">
         <p:fade/>
       </p:transition>
@@ -10775,13 +10949,13 @@
   <p:clrMapOvr>
     <a:masterClrMapping/>
   </p:clrMapOvr>
-  <mc:AlternateContent xmlns:mc="http://schemas.openxmlformats.org/markup-compatibility/2006">
-    <mc:Choice xmlns:p15="http://schemas.microsoft.com/office/powerpoint/2012/main" Requires="p15">
+  <mc:AlternateContent xmlns:mc="http://schemas.openxmlformats.org/markup-compatibility/2006" xmlns:p15="http://schemas.microsoft.com/office/powerpoint/2012/main">
+    <mc:Choice Requires="p15">
       <p:transition xmlns:p14="http://schemas.microsoft.com/office/powerpoint/2010/main" spd="slow" p14:dur="2000">
         <p15:prstTrans prst="fracture"/>
       </p:transition>
     </mc:Choice>
-    <mc:Fallback>
+    <mc:Fallback xmlns="">
       <p:transition spd="slow">
         <p:fade/>
       </p:transition>
@@ -12994,13 +13168,13 @@
   <p:clrMapOvr>
     <a:masterClrMapping/>
   </p:clrMapOvr>
-  <mc:AlternateContent xmlns:mc="http://schemas.openxmlformats.org/markup-compatibility/2006">
-    <mc:Choice xmlns:p14="http://schemas.microsoft.com/office/powerpoint/2010/main" Requires="p14">
+  <mc:AlternateContent xmlns:mc="http://schemas.openxmlformats.org/markup-compatibility/2006" xmlns:p14="http://schemas.microsoft.com/office/powerpoint/2010/main">
+    <mc:Choice Requires="p14">
       <p:transition spd="slow" p14:dur="1400">
         <p14:doors dir="vert"/>
       </p:transition>
     </mc:Choice>
-    <mc:Fallback>
+    <mc:Fallback xmlns="">
       <p:transition spd="slow">
         <p:fade/>
       </p:transition>
@@ -14224,13 +14398,13 @@
   <p:clrMapOvr>
     <a:masterClrMapping/>
   </p:clrMapOvr>
-  <mc:AlternateContent xmlns:mc="http://schemas.openxmlformats.org/markup-compatibility/2006">
-    <mc:Choice xmlns:p15="http://schemas.microsoft.com/office/powerpoint/2012/main" Requires="p15">
+  <mc:AlternateContent xmlns:mc="http://schemas.openxmlformats.org/markup-compatibility/2006" xmlns:p15="http://schemas.microsoft.com/office/powerpoint/2012/main">
+    <mc:Choice Requires="p15">
       <p:transition xmlns:p14="http://schemas.microsoft.com/office/powerpoint/2010/main" spd="slow" p14:dur="2000">
         <p15:prstTrans prst="fracture"/>
       </p:transition>
     </mc:Choice>
-    <mc:Fallback>
+    <mc:Fallback xmlns="">
       <p:transition spd="slow">
         <p:fade/>
       </p:transition>
@@ -14528,13 +14702,13 @@
   <p:clrMapOvr>
     <a:masterClrMapping/>
   </p:clrMapOvr>
-  <mc:AlternateContent xmlns:mc="http://schemas.openxmlformats.org/markup-compatibility/2006">
-    <mc:Choice xmlns:p159="http://schemas.microsoft.com/office/powerpoint/2015/09/main" Requires="p159">
+  <mc:AlternateContent xmlns:mc="http://schemas.openxmlformats.org/markup-compatibility/2006" xmlns:p159="http://schemas.microsoft.com/office/powerpoint/2015/09/main">
+    <mc:Choice Requires="p159">
       <p:transition xmlns:p14="http://schemas.microsoft.com/office/powerpoint/2010/main" spd="slow" p14:dur="2000">
         <p159:morph option="byObject"/>
       </p:transition>
     </mc:Choice>
-    <mc:Fallback>
+    <mc:Fallback xmlns="">
       <p:transition spd="slow">
         <p:fade/>
       </p:transition>

</xml_diff>